<commit_message>
Added intro and Data Description To Slidedeck
</commit_message>
<xml_diff>
--- a/American Health Final Presentation DS202.pptx
+++ b/American Health Final Presentation DS202.pptx
@@ -8,10 +8,12 @@
     <p:sldId id="256" r:id="rId2"/>
     <p:sldId id="258" r:id="rId3"/>
     <p:sldId id="263" r:id="rId4"/>
-    <p:sldId id="264" r:id="rId5"/>
-    <p:sldId id="265" r:id="rId6"/>
-    <p:sldId id="266" r:id="rId7"/>
-    <p:sldId id="267" r:id="rId8"/>
+    <p:sldId id="269" r:id="rId5"/>
+    <p:sldId id="264" r:id="rId6"/>
+    <p:sldId id="265" r:id="rId7"/>
+    <p:sldId id="266" r:id="rId8"/>
+    <p:sldId id="267" r:id="rId9"/>
+    <p:sldId id="268" r:id="rId10"/>
   </p:sldIdLst>
   <p:sldSz cx="12192000" cy="6858000"/>
   <p:notesSz cx="6858000" cy="9144000"/>
@@ -110,6 +112,11 @@
       </a:defRPr>
     </a:lvl9pPr>
   </p:defaultTextStyle>
+  <p:extLst>
+    <p:ext uri="{EFAFB233-063F-42B5-8137-9DF3F51BA10A}">
+      <p15:sldGuideLst xmlns:p15="http://schemas.microsoft.com/office/powerpoint/2012/main"/>
+    </p:ext>
+  </p:extLst>
 </p:presentation>
 </file>
 
@@ -426,7 +433,7 @@
           <a:p>
             <a:fld id="{1E351CED-465B-40B5-ADCE-957C918F227B}" type="datetimeFigureOut">
               <a:rPr lang="en-US" smtClean="0"/>
-              <a:t>12/8/2024</a:t>
+              <a:t>12/9/2024</a:t>
             </a:fld>
             <a:endParaRPr lang="en-US"/>
           </a:p>
@@ -634,7 +641,7 @@
           <a:p>
             <a:fld id="{1E351CED-465B-40B5-ADCE-957C918F227B}" type="datetimeFigureOut">
               <a:rPr lang="en-US" smtClean="0"/>
-              <a:t>12/8/2024</a:t>
+              <a:t>12/9/2024</a:t>
             </a:fld>
             <a:endParaRPr lang="en-US"/>
           </a:p>
@@ -844,7 +851,7 @@
           <a:p>
             <a:fld id="{1E351CED-465B-40B5-ADCE-957C918F227B}" type="datetimeFigureOut">
               <a:rPr lang="en-US" smtClean="0"/>
-              <a:t>12/8/2024</a:t>
+              <a:t>12/9/2024</a:t>
             </a:fld>
             <a:endParaRPr lang="en-US"/>
           </a:p>
@@ -1044,7 +1051,7 @@
           <a:p>
             <a:fld id="{1E351CED-465B-40B5-ADCE-957C918F227B}" type="datetimeFigureOut">
               <a:rPr lang="en-US" smtClean="0"/>
-              <a:t>12/8/2024</a:t>
+              <a:t>12/9/2024</a:t>
             </a:fld>
             <a:endParaRPr lang="en-US"/>
           </a:p>
@@ -1622,7 +1629,7 @@
           <a:p>
             <a:fld id="{1E351CED-465B-40B5-ADCE-957C918F227B}" type="datetimeFigureOut">
               <a:rPr lang="en-US" smtClean="0"/>
-              <a:t>12/8/2024</a:t>
+              <a:t>12/9/2024</a:t>
             </a:fld>
             <a:endParaRPr lang="en-US"/>
           </a:p>
@@ -1895,7 +1902,7 @@
           <a:p>
             <a:fld id="{1E351CED-465B-40B5-ADCE-957C918F227B}" type="datetimeFigureOut">
               <a:rPr lang="en-US" smtClean="0"/>
-              <a:t>12/8/2024</a:t>
+              <a:t>12/9/2024</a:t>
             </a:fld>
             <a:endParaRPr lang="en-US"/>
           </a:p>
@@ -2312,7 +2319,7 @@
           <a:p>
             <a:fld id="{1E351CED-465B-40B5-ADCE-957C918F227B}" type="datetimeFigureOut">
               <a:rPr lang="en-US" smtClean="0"/>
-              <a:t>12/8/2024</a:t>
+              <a:t>12/9/2024</a:t>
             </a:fld>
             <a:endParaRPr lang="en-US"/>
           </a:p>
@@ -2459,7 +2466,7 @@
           <a:p>
             <a:fld id="{1E351CED-465B-40B5-ADCE-957C918F227B}" type="datetimeFigureOut">
               <a:rPr lang="en-US" smtClean="0"/>
-              <a:t>12/8/2024</a:t>
+              <a:t>12/9/2024</a:t>
             </a:fld>
             <a:endParaRPr lang="en-US"/>
           </a:p>
@@ -2572,7 +2579,7 @@
           <a:p>
             <a:fld id="{1E351CED-465B-40B5-ADCE-957C918F227B}" type="datetimeFigureOut">
               <a:rPr lang="en-US" smtClean="0"/>
-              <a:t>12/8/2024</a:t>
+              <a:t>12/9/2024</a:t>
             </a:fld>
             <a:endParaRPr lang="en-US"/>
           </a:p>
@@ -2887,7 +2894,7 @@
           <a:p>
             <a:fld id="{1E351CED-465B-40B5-ADCE-957C918F227B}" type="datetimeFigureOut">
               <a:rPr lang="en-US" smtClean="0"/>
-              <a:t>12/8/2024</a:t>
+              <a:t>12/9/2024</a:t>
             </a:fld>
             <a:endParaRPr lang="en-US"/>
           </a:p>
@@ -3181,7 +3188,7 @@
           <a:p>
             <a:fld id="{1E351CED-465B-40B5-ADCE-957C918F227B}" type="datetimeFigureOut">
               <a:rPr lang="en-US" smtClean="0"/>
-              <a:t>12/8/2024</a:t>
+              <a:t>12/9/2024</a:t>
             </a:fld>
             <a:endParaRPr lang="en-US"/>
           </a:p>
@@ -3422,7 +3429,7 @@
           <a:p>
             <a:fld id="{1E351CED-465B-40B5-ADCE-957C918F227B}" type="datetimeFigureOut">
               <a:rPr lang="en-US" smtClean="0"/>
-              <a:t>12/8/2024</a:t>
+              <a:t>12/9/2024</a:t>
             </a:fld>
             <a:endParaRPr lang="en-US"/>
           </a:p>
@@ -4392,7 +4399,7 @@
                   <a:srgbClr val="FFFFFF"/>
                 </a:solidFill>
               </a:rPr>
-              <a:t>American Health</a:t>
+              <a:t>Introduction</a:t>
             </a:r>
           </a:p>
         </p:txBody>
@@ -4488,9 +4495,33 @@
           </a:bodyPr>
           <a:lstStyle/>
           <a:p>
-            <a:r>
-              <a:rPr lang="en-US" sz="1600" dirty="0"/>
-              <a:t>Slide #</a:t>
+            <a:pPr marL="342900" indent="-342900">
+              <a:buFontTx/>
+              <a:buChar char="-"/>
+            </a:pPr>
+            <a:r>
+              <a:rPr lang="en-US" dirty="0"/>
+              <a:t>Data from Data.gov as a CSV</a:t>
+            </a:r>
+          </a:p>
+          <a:p>
+            <a:pPr marL="342900" indent="-342900">
+              <a:buFontTx/>
+              <a:buChar char="-"/>
+            </a:pPr>
+            <a:r>
+              <a:rPr lang="en-US" dirty="0"/>
+              <a:t>Sparse data arranged by year the sample of people was asked a given health-centered question</a:t>
+            </a:r>
+          </a:p>
+          <a:p>
+            <a:pPr marL="342900" indent="-342900">
+              <a:buFontTx/>
+              <a:buChar char="-"/>
+            </a:pPr>
+            <a:r>
+              <a:rPr lang="en-US" dirty="0"/>
+              <a:t>We wanted to apply what we had learned from class this semester to  American health demographics to see what kinds of relationships there are between variables.</a:t>
             </a:r>
           </a:p>
         </p:txBody>
@@ -4758,7 +4789,7 @@
                   <a:srgbClr val="FFFFFF"/>
                 </a:solidFill>
               </a:rPr>
-              <a:t>American Health</a:t>
+              <a:t>Data pt.1</a:t>
             </a:r>
           </a:p>
         </p:txBody>
@@ -4855,8 +4886,170 @@
           <a:lstStyle/>
           <a:p>
             <a:r>
-              <a:rPr lang="en-US" sz="1600" dirty="0"/>
-              <a:t>Slide #</a:t>
+              <a:rPr lang="en-US" dirty="0"/>
+              <a:t>Our data started with 33 columns, including:</a:t>
+            </a:r>
+          </a:p>
+          <a:p>
+            <a:r>
+              <a:rPr lang="en-US" dirty="0" err="1"/>
+              <a:t>YearStart</a:t>
+            </a:r>
+            <a:r>
+              <a:rPr lang="en-US" dirty="0"/>
+              <a:t>, </a:t>
+            </a:r>
+            <a:r>
+              <a:rPr lang="en-US" dirty="0" err="1"/>
+              <a:t>YearEnd</a:t>
+            </a:r>
+            <a:r>
+              <a:rPr lang="en-US" dirty="0"/>
+              <a:t>, </a:t>
+            </a:r>
+            <a:r>
+              <a:rPr lang="en-US" dirty="0" err="1"/>
+              <a:t>LocationAbbreviation</a:t>
+            </a:r>
+            <a:r>
+              <a:rPr lang="en-US" dirty="0"/>
+              <a:t>, </a:t>
+            </a:r>
+            <a:r>
+              <a:rPr lang="en-US" dirty="0" err="1"/>
+              <a:t>LocationDescription</a:t>
+            </a:r>
+            <a:r>
+              <a:rPr lang="en-US" dirty="0"/>
+              <a:t>, </a:t>
+            </a:r>
+            <a:r>
+              <a:rPr lang="en-US" dirty="0" err="1"/>
+              <a:t>DataSource</a:t>
+            </a:r>
+            <a:r>
+              <a:rPr lang="en-US" dirty="0"/>
+              <a:t>, Class, Topic, Question, </a:t>
+            </a:r>
+            <a:r>
+              <a:rPr lang="en-US" dirty="0" err="1"/>
+              <a:t>Data_Value_Unit</a:t>
+            </a:r>
+            <a:r>
+              <a:rPr lang="en-US" dirty="0"/>
+              <a:t>, </a:t>
+            </a:r>
+            <a:r>
+              <a:rPr lang="en-US" dirty="0" err="1"/>
+              <a:t>Data_Value_Type</a:t>
+            </a:r>
+            <a:r>
+              <a:rPr lang="en-US" dirty="0"/>
+              <a:t>, </a:t>
+            </a:r>
+            <a:r>
+              <a:rPr lang="en-US" dirty="0" err="1"/>
+              <a:t>Data_Value</a:t>
+            </a:r>
+            <a:r>
+              <a:rPr lang="en-US" dirty="0"/>
+              <a:t>, </a:t>
+            </a:r>
+            <a:r>
+              <a:rPr lang="en-US" dirty="0" err="1"/>
+              <a:t>Data_Value_Alt</a:t>
+            </a:r>
+            <a:r>
+              <a:rPr lang="en-US" dirty="0"/>
+              <a:t>, </a:t>
+            </a:r>
+            <a:r>
+              <a:rPr lang="en-US" dirty="0" err="1"/>
+              <a:t>Data_Value_Footnote_Symbol</a:t>
+            </a:r>
+            <a:r>
+              <a:rPr lang="en-US" dirty="0"/>
+              <a:t>, </a:t>
+            </a:r>
+            <a:r>
+              <a:rPr lang="en-US" dirty="0" err="1"/>
+              <a:t>Data_Value_Footnote</a:t>
+            </a:r>
+            <a:r>
+              <a:rPr lang="en-US" dirty="0"/>
+              <a:t>, </a:t>
+            </a:r>
+            <a:r>
+              <a:rPr lang="en-US" dirty="0" err="1"/>
+              <a:t>Low_Confidence_Limit</a:t>
+            </a:r>
+            <a:r>
+              <a:rPr lang="en-US" dirty="0"/>
+              <a:t>, </a:t>
+            </a:r>
+            <a:r>
+              <a:rPr lang="en-US" dirty="0" err="1"/>
+              <a:t>High_Confidence_Limit</a:t>
+            </a:r>
+            <a:r>
+              <a:rPr lang="en-US" dirty="0"/>
+              <a:t>, </a:t>
+            </a:r>
+            <a:r>
+              <a:rPr lang="en-US" dirty="0" err="1"/>
+              <a:t>Sample_Size</a:t>
+            </a:r>
+            <a:r>
+              <a:rPr lang="en-US" dirty="0"/>
+              <a:t>, Total, Age(years), Education, Gender, Income, Race/Ethnicity, </a:t>
+            </a:r>
+            <a:r>
+              <a:rPr lang="en-US" dirty="0" err="1"/>
+              <a:t>GeoLocation</a:t>
+            </a:r>
+            <a:r>
+              <a:rPr lang="en-US" dirty="0"/>
+              <a:t>, </a:t>
+            </a:r>
+            <a:r>
+              <a:rPr lang="en-US" dirty="0" err="1"/>
+              <a:t>ClassID</a:t>
+            </a:r>
+            <a:r>
+              <a:rPr lang="en-US" dirty="0"/>
+              <a:t>, </a:t>
+            </a:r>
+            <a:r>
+              <a:rPr lang="en-US" dirty="0" err="1"/>
+              <a:t>TopicID</a:t>
+            </a:r>
+            <a:r>
+              <a:rPr lang="en-US" dirty="0"/>
+              <a:t>, </a:t>
+            </a:r>
+            <a:r>
+              <a:rPr lang="en-US" dirty="0" err="1"/>
+              <a:t>QuestionID</a:t>
+            </a:r>
+            <a:r>
+              <a:rPr lang="en-US" dirty="0"/>
+              <a:t>, </a:t>
+            </a:r>
+            <a:r>
+              <a:rPr lang="en-US" dirty="0" err="1"/>
+              <a:t>DataValueTypeID</a:t>
+            </a:r>
+            <a:r>
+              <a:rPr lang="en-US" dirty="0"/>
+              <a:t>, </a:t>
+            </a:r>
+            <a:r>
+              <a:rPr lang="en-US" dirty="0" err="1"/>
+              <a:t>LocationID</a:t>
+            </a:r>
+            <a:r>
+              <a:rPr lang="en-US" dirty="0"/>
+              <a:t>, StratificationCategory1, Stratification1, StratificationCategoryID1, StratificationID1</a:t>
             </a:r>
           </a:p>
         </p:txBody>
@@ -4875,6 +5068,427 @@
 </file>
 
 <file path=ppt/slides/slide4.xml><?xml version="1.0" encoding="utf-8"?>
+<p:sld xmlns:a="http://schemas.openxmlformats.org/drawingml/2006/main" xmlns:r="http://schemas.openxmlformats.org/officeDocument/2006/relationships" xmlns:p="http://schemas.openxmlformats.org/presentationml/2006/main">
+  <p:cSld>
+    <p:bg>
+      <p:bgPr>
+        <a:solidFill>
+          <a:schemeClr val="bg1"/>
+        </a:solidFill>
+        <a:effectLst/>
+      </p:bgPr>
+    </p:bg>
+    <p:spTree>
+      <p:nvGrpSpPr>
+        <p:cNvPr id="1" name="">
+          <a:extLst>
+            <a:ext uri="{FF2B5EF4-FFF2-40B4-BE49-F238E27FC236}">
+              <a16:creationId xmlns:a16="http://schemas.microsoft.com/office/drawing/2014/main" id="{A2B85819-A555-0F0E-B349-E92346680E48}"/>
+            </a:ext>
+          </a:extLst>
+        </p:cNvPr>
+        <p:cNvGrpSpPr/>
+        <p:nvPr/>
+      </p:nvGrpSpPr>
+      <p:grpSpPr>
+        <a:xfrm>
+          <a:off x="0" y="0"/>
+          <a:ext cx="0" cy="0"/>
+          <a:chOff x="0" y="0"/>
+          <a:chExt cx="0" cy="0"/>
+        </a:xfrm>
+      </p:grpSpPr>
+      <p:sp useBgFill="1">
+        <p:nvSpPr>
+          <p:cNvPr id="60" name="Rectangle 59">
+            <a:extLst>
+              <a:ext uri="{FF2B5EF4-FFF2-40B4-BE49-F238E27FC236}">
+                <a16:creationId xmlns:a16="http://schemas.microsoft.com/office/drawing/2014/main" id="{1699444A-4EE9-B3AD-4292-8450241380CE}"/>
+              </a:ext>
+              <a:ext uri="{C183D7F6-B498-43B3-948B-1728B52AA6E4}">
+                <adec:decorative xmlns:adec="http://schemas.microsoft.com/office/drawing/2017/decorative" val="1"/>
+              </a:ext>
+            </a:extLst>
+          </p:cNvPr>
+          <p:cNvSpPr>
+            <a:spLocks noGrp="1" noRot="1" noChangeAspect="1" noMove="1" noResize="1" noEditPoints="1" noAdjustHandles="1" noChangeArrowheads="1" noChangeShapeType="1" noTextEdit="1"/>
+          </p:cNvSpPr>
+          <p:nvPr>
+            <p:extLst>
+              <p:ext uri="{386F3935-93C4-4BCD-93E2-E3B085C9AB24}">
+                <p16:designElem xmlns:p16="http://schemas.microsoft.com/office/powerpoint/2015/main" val="1"/>
+              </p:ext>
+            </p:extLst>
+          </p:nvPr>
+        </p:nvSpPr>
+        <p:spPr>
+          <a:xfrm>
+            <a:off x="0" y="0"/>
+            <a:ext cx="12192000" cy="6858000"/>
+          </a:xfrm>
+          <a:prstGeom prst="rect">
+            <a:avLst/>
+          </a:prstGeom>
+          <a:ln w="12700" cap="flat" cmpd="sng" algn="ctr">
+            <a:noFill/>
+            <a:prstDash val="solid"/>
+            <a:miter lim="800000"/>
+          </a:ln>
+          <a:effectLst/>
+          <a:extLst>
+            <a:ext uri="{91240B29-F687-4F45-9708-019B960494DF}">
+              <a14:hiddenLine xmlns:a14="http://schemas.microsoft.com/office/drawing/2010/main" w="12700" cap="flat" cmpd="sng" algn="ctr">
+                <a:solidFill>
+                  <a:schemeClr val="accent1">
+                    <a:shade val="50000"/>
+                  </a:schemeClr>
+                </a:solidFill>
+                <a:prstDash val="solid"/>
+                <a:miter lim="800000"/>
+              </a14:hiddenLine>
+            </a:ext>
+          </a:extLst>
+        </p:spPr>
+        <p:style>
+          <a:lnRef idx="2">
+            <a:schemeClr val="accent1">
+              <a:shade val="50000"/>
+            </a:schemeClr>
+          </a:lnRef>
+          <a:fillRef idx="1">
+            <a:schemeClr val="accent1"/>
+          </a:fillRef>
+          <a:effectRef idx="0">
+            <a:schemeClr val="accent1"/>
+          </a:effectRef>
+          <a:fontRef idx="minor">
+            <a:schemeClr val="lt1"/>
+          </a:fontRef>
+        </p:style>
+        <p:txBody>
+          <a:bodyPr rtlCol="0" anchor="ctr"/>
+          <a:lstStyle/>
+          <a:p>
+            <a:pPr algn="ctr"/>
+            <a:endParaRPr lang="en-US"/>
+          </a:p>
+        </p:txBody>
+      </p:sp>
+      <p:pic>
+        <p:nvPicPr>
+          <p:cNvPr id="53" name="Picture 52" descr="Vector background of vibrant colors splashing">
+            <a:extLst>
+              <a:ext uri="{FF2B5EF4-FFF2-40B4-BE49-F238E27FC236}">
+                <a16:creationId xmlns:a16="http://schemas.microsoft.com/office/drawing/2014/main" id="{06BC7B50-8D54-1A6F-863E-CCB27CEAC4A0}"/>
+              </a:ext>
+            </a:extLst>
+          </p:cNvPr>
+          <p:cNvPicPr>
+            <a:picLocks noChangeAspect="1"/>
+          </p:cNvPicPr>
+          <p:nvPr/>
+        </p:nvPicPr>
+        <p:blipFill>
+          <a:blip r:embed="rId2"/>
+          <a:srcRect t="17279"/>
+          <a:stretch/>
+        </p:blipFill>
+        <p:spPr>
+          <a:xfrm>
+            <a:off x="-3" y="-3"/>
+            <a:ext cx="12191979" cy="6857989"/>
+          </a:xfrm>
+          <a:prstGeom prst="rect">
+            <a:avLst/>
+          </a:prstGeom>
+        </p:spPr>
+      </p:pic>
+      <p:sp>
+        <p:nvSpPr>
+          <p:cNvPr id="62" name="Rectangle 61">
+            <a:extLst>
+              <a:ext uri="{FF2B5EF4-FFF2-40B4-BE49-F238E27FC236}">
+                <a16:creationId xmlns:a16="http://schemas.microsoft.com/office/drawing/2014/main" id="{677DC9CA-DD1C-1BF8-E653-C69F1D34F899}"/>
+              </a:ext>
+              <a:ext uri="{C183D7F6-B498-43B3-948B-1728B52AA6E4}">
+                <adec:decorative xmlns:adec="http://schemas.microsoft.com/office/drawing/2017/decorative" val="1"/>
+              </a:ext>
+            </a:extLst>
+          </p:cNvPr>
+          <p:cNvSpPr>
+            <a:spLocks noGrp="1" noRot="1" noChangeAspect="1" noMove="1" noResize="1" noEditPoints="1" noAdjustHandles="1" noChangeArrowheads="1" noChangeShapeType="1" noTextEdit="1"/>
+          </p:cNvSpPr>
+          <p:nvPr>
+            <p:extLst>
+              <p:ext uri="{386F3935-93C4-4BCD-93E2-E3B085C9AB24}">
+                <p16:designElem xmlns:p16="http://schemas.microsoft.com/office/powerpoint/2015/main" val="1"/>
+              </p:ext>
+            </p:extLst>
+          </p:nvPr>
+        </p:nvSpPr>
+        <p:spPr>
+          <a:xfrm rot="5400000">
+            <a:off x="960265" y="-960268"/>
+            <a:ext cx="6857998" cy="8778533"/>
+          </a:xfrm>
+          <a:prstGeom prst="rect">
+            <a:avLst/>
+          </a:prstGeom>
+          <a:gradFill>
+            <a:gsLst>
+              <a:gs pos="0">
+                <a:srgbClr val="000000">
+                  <a:alpha val="0"/>
+                </a:srgbClr>
+              </a:gs>
+              <a:gs pos="67900">
+                <a:srgbClr val="000000">
+                  <a:alpha val="33000"/>
+                </a:srgbClr>
+              </a:gs>
+              <a:gs pos="100000">
+                <a:srgbClr val="000000">
+                  <a:alpha val="52000"/>
+                </a:srgbClr>
+              </a:gs>
+            </a:gsLst>
+            <a:lin ang="5400000" scaled="1"/>
+          </a:gradFill>
+          <a:ln>
+            <a:noFill/>
+          </a:ln>
+        </p:spPr>
+        <p:style>
+          <a:lnRef idx="2">
+            <a:schemeClr val="accent1">
+              <a:shade val="50000"/>
+            </a:schemeClr>
+          </a:lnRef>
+          <a:fillRef idx="1">
+            <a:schemeClr val="accent1"/>
+          </a:fillRef>
+          <a:effectRef idx="0">
+            <a:schemeClr val="accent1"/>
+          </a:effectRef>
+          <a:fontRef idx="minor">
+            <a:schemeClr val="lt1"/>
+          </a:fontRef>
+        </p:style>
+        <p:txBody>
+          <a:bodyPr rtlCol="0" anchor="ctr"/>
+          <a:lstStyle/>
+          <a:p>
+            <a:pPr algn="ctr"/>
+            <a:endParaRPr lang="en-US"/>
+          </a:p>
+        </p:txBody>
+      </p:sp>
+      <p:sp>
+        <p:nvSpPr>
+          <p:cNvPr id="2" name="Title 1">
+            <a:extLst>
+              <a:ext uri="{FF2B5EF4-FFF2-40B4-BE49-F238E27FC236}">
+                <a16:creationId xmlns:a16="http://schemas.microsoft.com/office/drawing/2014/main" id="{B48A1B46-5311-D9F4-463C-6B72092CE435}"/>
+              </a:ext>
+            </a:extLst>
+          </p:cNvPr>
+          <p:cNvSpPr>
+            <a:spLocks noGrp="1"/>
+          </p:cNvSpPr>
+          <p:nvPr>
+            <p:ph type="ctrTitle"/>
+          </p:nvPr>
+        </p:nvSpPr>
+        <p:spPr>
+          <a:xfrm>
+            <a:off x="1066802" y="-762072"/>
+            <a:ext cx="5029198" cy="2305246"/>
+          </a:xfrm>
+        </p:spPr>
+        <p:txBody>
+          <a:bodyPr>
+            <a:normAutofit/>
+          </a:bodyPr>
+          <a:lstStyle/>
+          <a:p>
+            <a:r>
+              <a:rPr lang="en-US" sz="4400" dirty="0">
+                <a:solidFill>
+                  <a:srgbClr val="FFFFFF"/>
+                </a:solidFill>
+              </a:rPr>
+              <a:t>Data pt.2</a:t>
+            </a:r>
+          </a:p>
+        </p:txBody>
+      </p:sp>
+      <p:sp>
+        <p:nvSpPr>
+          <p:cNvPr id="4" name="Rectangle 3">
+            <a:extLst>
+              <a:ext uri="{FF2B5EF4-FFF2-40B4-BE49-F238E27FC236}">
+                <a16:creationId xmlns:a16="http://schemas.microsoft.com/office/drawing/2014/main" id="{5611147B-01BF-CDE8-A524-56BD8F80E96A}"/>
+              </a:ext>
+            </a:extLst>
+          </p:cNvPr>
+          <p:cNvSpPr/>
+          <p:nvPr/>
+        </p:nvSpPr>
+        <p:spPr>
+          <a:xfrm>
+            <a:off x="704850" y="1695450"/>
+            <a:ext cx="10563225" cy="4743450"/>
+          </a:xfrm>
+          <a:prstGeom prst="rect">
+            <a:avLst/>
+          </a:prstGeom>
+          <a:solidFill>
+            <a:schemeClr val="bg1"/>
+          </a:solidFill>
+          <a:ln>
+            <a:solidFill>
+              <a:schemeClr val="bg1"/>
+            </a:solidFill>
+          </a:ln>
+        </p:spPr>
+        <p:style>
+          <a:lnRef idx="2">
+            <a:schemeClr val="accent1">
+              <a:shade val="15000"/>
+            </a:schemeClr>
+          </a:lnRef>
+          <a:fillRef idx="1">
+            <a:schemeClr val="accent1"/>
+          </a:fillRef>
+          <a:effectRef idx="0">
+            <a:schemeClr val="accent1"/>
+          </a:effectRef>
+          <a:fontRef idx="minor">
+            <a:schemeClr val="lt1"/>
+          </a:fontRef>
+        </p:style>
+        <p:txBody>
+          <a:bodyPr rtlCol="0" anchor="ctr"/>
+          <a:lstStyle/>
+          <a:p>
+            <a:pPr algn="ctr"/>
+            <a:endParaRPr lang="en-US" dirty="0">
+              <a:ln>
+                <a:solidFill>
+                  <a:schemeClr val="bg1"/>
+                </a:solidFill>
+              </a:ln>
+              <a:solidFill>
+                <a:schemeClr val="bg1"/>
+              </a:solidFill>
+            </a:endParaRPr>
+          </a:p>
+        </p:txBody>
+      </p:sp>
+      <p:sp>
+        <p:nvSpPr>
+          <p:cNvPr id="3" name="Subtitle 2">
+            <a:extLst>
+              <a:ext uri="{FF2B5EF4-FFF2-40B4-BE49-F238E27FC236}">
+                <a16:creationId xmlns:a16="http://schemas.microsoft.com/office/drawing/2014/main" id="{8F812308-DDBB-B269-46B3-A8C891608FE8}"/>
+              </a:ext>
+            </a:extLst>
+          </p:cNvPr>
+          <p:cNvSpPr>
+            <a:spLocks noGrp="1"/>
+          </p:cNvSpPr>
+          <p:nvPr>
+            <p:ph type="subTitle" idx="1"/>
+          </p:nvPr>
+        </p:nvSpPr>
+        <p:spPr>
+          <a:xfrm>
+            <a:off x="1066802" y="1977542"/>
+            <a:ext cx="9814558" cy="4203801"/>
+          </a:xfrm>
+        </p:spPr>
+        <p:txBody>
+          <a:bodyPr>
+            <a:normAutofit/>
+          </a:bodyPr>
+          <a:lstStyle/>
+          <a:p>
+            <a:r>
+              <a:rPr lang="en-US" dirty="0"/>
+              <a:t>Basically, a large number of the columns were either too foreign to mean anything to us (like Question ID), seemed redundant (like Class and Topic often overlapped), or the data column was just not needed (like </a:t>
+            </a:r>
+            <a:r>
+              <a:rPr lang="en-US" dirty="0" err="1"/>
+              <a:t>Datasource</a:t>
+            </a:r>
+            <a:r>
+              <a:rPr lang="en-US" dirty="0"/>
+              <a:t>)</a:t>
+            </a:r>
+          </a:p>
+          <a:p>
+            <a:endParaRPr lang="en-US" dirty="0"/>
+          </a:p>
+          <a:p>
+            <a:r>
+              <a:rPr lang="en-US" dirty="0"/>
+              <a:t>The data that was pulled has rows that results were “insufficient in size”, and there were occurrences of empty rows, and our data was </a:t>
+            </a:r>
+            <a:r>
+              <a:rPr lang="en-US" b="1" dirty="0"/>
+              <a:t>sparse</a:t>
+            </a:r>
+            <a:r>
+              <a:rPr lang="en-US" dirty="0"/>
+              <a:t> to begin with.</a:t>
+            </a:r>
+          </a:p>
+        </p:txBody>
+      </p:sp>
+      <p:pic>
+        <p:nvPicPr>
+          <p:cNvPr id="6" name="Picture 5">
+            <a:extLst>
+              <a:ext uri="{FF2B5EF4-FFF2-40B4-BE49-F238E27FC236}">
+                <a16:creationId xmlns:a16="http://schemas.microsoft.com/office/drawing/2014/main" id="{C1924ECB-8AFC-604C-1B8F-BCD5276840C4}"/>
+              </a:ext>
+            </a:extLst>
+          </p:cNvPr>
+          <p:cNvPicPr>
+            <a:picLocks noChangeAspect="1"/>
+          </p:cNvPicPr>
+          <p:nvPr/>
+        </p:nvPicPr>
+        <p:blipFill>
+          <a:blip r:embed="rId3"/>
+          <a:stretch>
+            <a:fillRect/>
+          </a:stretch>
+        </p:blipFill>
+        <p:spPr>
+          <a:xfrm>
+            <a:off x="1139925" y="4795786"/>
+            <a:ext cx="9438311" cy="1111238"/>
+          </a:xfrm>
+          <a:prstGeom prst="rect">
+            <a:avLst/>
+          </a:prstGeom>
+        </p:spPr>
+      </p:pic>
+    </p:spTree>
+    <p:extLst>
+      <p:ext uri="{BB962C8B-B14F-4D97-AF65-F5344CB8AC3E}">
+        <p14:creationId xmlns:p14="http://schemas.microsoft.com/office/powerpoint/2010/main" val="2393450544"/>
+      </p:ext>
+    </p:extLst>
+  </p:cSld>
+  <p:clrMapOvr>
+    <a:masterClrMapping/>
+  </p:clrMapOvr>
+</p:sld>
+</file>
+
+<file path=ppt/slides/slide5.xml><?xml version="1.0" encoding="utf-8"?>
 <p:sld xmlns:a="http://schemas.openxmlformats.org/drawingml/2006/main" xmlns:r="http://schemas.openxmlformats.org/officeDocument/2006/relationships" xmlns:p="http://schemas.openxmlformats.org/presentationml/2006/main">
   <p:cSld>
     <p:bg>
@@ -5109,7 +5723,7 @@
         <p:spPr>
           <a:xfrm>
             <a:off x="1066802" y="-762072"/>
-            <a:ext cx="5029198" cy="2305246"/>
+            <a:ext cx="5791198" cy="2305246"/>
           </a:xfrm>
         </p:spPr>
         <p:txBody>
@@ -5124,7 +5738,7 @@
                   <a:srgbClr val="FFFFFF"/>
                 </a:solidFill>
               </a:rPr>
-              <a:t>American Health</a:t>
+              <a:t>Processing the Data</a:t>
             </a:r>
           </a:p>
         </p:txBody>
@@ -5194,25 +5808,221 @@
       </p:sp>
       <p:sp>
         <p:nvSpPr>
-          <p:cNvPr id="3" name="Subtitle 2">
-            <a:extLst>
-              <a:ext uri="{FF2B5EF4-FFF2-40B4-BE49-F238E27FC236}">
-                <a16:creationId xmlns:a16="http://schemas.microsoft.com/office/drawing/2014/main" id="{B868BCD3-DD2A-1104-AF31-51D1EBA2935D}"/>
-              </a:ext>
-            </a:extLst>
-          </p:cNvPr>
-          <p:cNvSpPr>
-            <a:spLocks noGrp="1"/>
-          </p:cNvSpPr>
-          <p:nvPr>
-            <p:ph type="subTitle" idx="1"/>
-          </p:nvPr>
+          <p:cNvPr id="8" name="Subtitle 2">
+            <a:extLst>
+              <a:ext uri="{FF2B5EF4-FFF2-40B4-BE49-F238E27FC236}">
+                <a16:creationId xmlns:a16="http://schemas.microsoft.com/office/drawing/2014/main" id="{60482AAA-A81E-C853-5AC9-5B9FA860BECA}"/>
+              </a:ext>
+            </a:extLst>
+          </p:cNvPr>
+          <p:cNvSpPr txBox="1">
+            <a:spLocks/>
+          </p:cNvSpPr>
+          <p:nvPr/>
         </p:nvSpPr>
         <p:spPr>
           <a:xfrm>
             <a:off x="1066802" y="1977542"/>
             <a:ext cx="9814558" cy="4203801"/>
           </a:xfrm>
+          <a:prstGeom prst="rect">
+            <a:avLst/>
+          </a:prstGeom>
+        </p:spPr>
+        <p:txBody>
+          <a:bodyPr vert="horz" lIns="91440" tIns="45720" rIns="91440" bIns="45720" rtlCol="0">
+            <a:normAutofit/>
+          </a:bodyPr>
+          <a:lstStyle>
+            <a:lvl1pPr marL="0" indent="0" algn="l" defTabSz="914400" rtl="0" eaLnBrk="1" latinLnBrk="0" hangingPunct="1">
+              <a:lnSpc>
+                <a:spcPct val="120000"/>
+              </a:lnSpc>
+              <a:spcBef>
+                <a:spcPts val="1000"/>
+              </a:spcBef>
+              <a:buFont typeface="Arial" panose="020B0604020202020204" pitchFamily="34" charset="0"/>
+              <a:buNone/>
+              <a:defRPr sz="2000" kern="1200">
+                <a:solidFill>
+                  <a:schemeClr val="tx1"/>
+                </a:solidFill>
+                <a:latin typeface="+mn-lt"/>
+                <a:ea typeface="+mn-ea"/>
+                <a:cs typeface="+mn-cs"/>
+              </a:defRPr>
+            </a:lvl1pPr>
+            <a:lvl2pPr marL="457200" indent="0" algn="ctr" defTabSz="914400" rtl="0" eaLnBrk="1" latinLnBrk="0" hangingPunct="1">
+              <a:lnSpc>
+                <a:spcPct val="120000"/>
+              </a:lnSpc>
+              <a:spcBef>
+                <a:spcPts val="500"/>
+              </a:spcBef>
+              <a:buFont typeface="Neue Haas Grotesk Text Pro" panose="020B0504020202020204" pitchFamily="34" charset="0"/>
+              <a:buNone/>
+              <a:defRPr sz="2000" kern="1200">
+                <a:solidFill>
+                  <a:schemeClr val="tx1"/>
+                </a:solidFill>
+                <a:latin typeface="+mn-lt"/>
+                <a:ea typeface="+mn-ea"/>
+                <a:cs typeface="+mn-cs"/>
+              </a:defRPr>
+            </a:lvl2pPr>
+            <a:lvl3pPr marL="914400" indent="0" algn="ctr" defTabSz="914400" rtl="0" eaLnBrk="1" latinLnBrk="0" hangingPunct="1">
+              <a:lnSpc>
+                <a:spcPct val="120000"/>
+              </a:lnSpc>
+              <a:spcBef>
+                <a:spcPts val="500"/>
+              </a:spcBef>
+              <a:buFont typeface="Arial" panose="020B0604020202020204" pitchFamily="34" charset="0"/>
+              <a:buNone/>
+              <a:defRPr sz="1800" kern="1200">
+                <a:solidFill>
+                  <a:schemeClr val="tx1"/>
+                </a:solidFill>
+                <a:latin typeface="+mn-lt"/>
+                <a:ea typeface="+mn-ea"/>
+                <a:cs typeface="+mn-cs"/>
+              </a:defRPr>
+            </a:lvl3pPr>
+            <a:lvl4pPr marL="1371600" indent="0" algn="ctr" defTabSz="914400" rtl="0" eaLnBrk="1" latinLnBrk="0" hangingPunct="1">
+              <a:lnSpc>
+                <a:spcPct val="120000"/>
+              </a:lnSpc>
+              <a:spcBef>
+                <a:spcPts val="500"/>
+              </a:spcBef>
+              <a:buFont typeface="Neue Haas Grotesk Text Pro" panose="020B0504020202020204" pitchFamily="34" charset="0"/>
+              <a:buNone/>
+              <a:defRPr sz="1600" kern="1200">
+                <a:solidFill>
+                  <a:schemeClr val="tx1"/>
+                </a:solidFill>
+                <a:latin typeface="+mn-lt"/>
+                <a:ea typeface="+mn-ea"/>
+                <a:cs typeface="+mn-cs"/>
+              </a:defRPr>
+            </a:lvl4pPr>
+            <a:lvl5pPr marL="1828800" indent="0" algn="ctr" defTabSz="914400" rtl="0" eaLnBrk="1" latinLnBrk="0" hangingPunct="1">
+              <a:lnSpc>
+                <a:spcPct val="120000"/>
+              </a:lnSpc>
+              <a:spcBef>
+                <a:spcPts val="500"/>
+              </a:spcBef>
+              <a:buFont typeface="Arial" panose="020B0604020202020204" pitchFamily="34" charset="0"/>
+              <a:buNone/>
+              <a:defRPr sz="1600" kern="1200">
+                <a:solidFill>
+                  <a:schemeClr val="tx1"/>
+                </a:solidFill>
+                <a:latin typeface="+mn-lt"/>
+                <a:ea typeface="+mn-ea"/>
+                <a:cs typeface="+mn-cs"/>
+              </a:defRPr>
+            </a:lvl5pPr>
+            <a:lvl6pPr marL="2286000" indent="0" algn="ctr" defTabSz="914400" rtl="0" eaLnBrk="1" latinLnBrk="0" hangingPunct="1">
+              <a:lnSpc>
+                <a:spcPct val="90000"/>
+              </a:lnSpc>
+              <a:spcBef>
+                <a:spcPts val="500"/>
+              </a:spcBef>
+              <a:buFont typeface="Arial" panose="020B0604020202020204" pitchFamily="34" charset="0"/>
+              <a:buNone/>
+              <a:defRPr sz="1600" kern="1200">
+                <a:solidFill>
+                  <a:schemeClr val="tx1"/>
+                </a:solidFill>
+                <a:latin typeface="+mn-lt"/>
+                <a:ea typeface="+mn-ea"/>
+                <a:cs typeface="+mn-cs"/>
+              </a:defRPr>
+            </a:lvl6pPr>
+            <a:lvl7pPr marL="2743200" indent="0" algn="ctr" defTabSz="914400" rtl="0" eaLnBrk="1" latinLnBrk="0" hangingPunct="1">
+              <a:lnSpc>
+                <a:spcPct val="90000"/>
+              </a:lnSpc>
+              <a:spcBef>
+                <a:spcPts val="500"/>
+              </a:spcBef>
+              <a:buFont typeface="Arial" panose="020B0604020202020204" pitchFamily="34" charset="0"/>
+              <a:buNone/>
+              <a:defRPr sz="1600" kern="1200">
+                <a:solidFill>
+                  <a:schemeClr val="tx1"/>
+                </a:solidFill>
+                <a:latin typeface="+mn-lt"/>
+                <a:ea typeface="+mn-ea"/>
+                <a:cs typeface="+mn-cs"/>
+              </a:defRPr>
+            </a:lvl7pPr>
+            <a:lvl8pPr marL="3200400" indent="0" algn="ctr" defTabSz="914400" rtl="0" eaLnBrk="1" latinLnBrk="0" hangingPunct="1">
+              <a:lnSpc>
+                <a:spcPct val="90000"/>
+              </a:lnSpc>
+              <a:spcBef>
+                <a:spcPts val="500"/>
+              </a:spcBef>
+              <a:buFont typeface="Arial" panose="020B0604020202020204" pitchFamily="34" charset="0"/>
+              <a:buNone/>
+              <a:defRPr sz="1600" kern="1200">
+                <a:solidFill>
+                  <a:schemeClr val="tx1"/>
+                </a:solidFill>
+                <a:latin typeface="+mn-lt"/>
+                <a:ea typeface="+mn-ea"/>
+                <a:cs typeface="+mn-cs"/>
+              </a:defRPr>
+            </a:lvl8pPr>
+            <a:lvl9pPr marL="3657600" indent="0" algn="ctr" defTabSz="914400" rtl="0" eaLnBrk="1" latinLnBrk="0" hangingPunct="1">
+              <a:lnSpc>
+                <a:spcPct val="90000"/>
+              </a:lnSpc>
+              <a:spcBef>
+                <a:spcPts val="500"/>
+              </a:spcBef>
+              <a:buFont typeface="Arial" panose="020B0604020202020204" pitchFamily="34" charset="0"/>
+              <a:buNone/>
+              <a:defRPr sz="1600" kern="1200">
+                <a:solidFill>
+                  <a:schemeClr val="tx1"/>
+                </a:solidFill>
+                <a:latin typeface="+mn-lt"/>
+                <a:ea typeface="+mn-ea"/>
+                <a:cs typeface="+mn-cs"/>
+              </a:defRPr>
+            </a:lvl9pPr>
+          </a:lstStyle>
+          <a:p>
+            <a:endParaRPr lang="en-US" dirty="0"/>
+          </a:p>
+        </p:txBody>
+      </p:sp>
+      <p:sp>
+        <p:nvSpPr>
+          <p:cNvPr id="9" name="Subtitle 2">
+            <a:extLst>
+              <a:ext uri="{FF2B5EF4-FFF2-40B4-BE49-F238E27FC236}">
+                <a16:creationId xmlns:a16="http://schemas.microsoft.com/office/drawing/2014/main" id="{08AE33D7-11C3-4338-BCCD-8DB38E28E2DA}"/>
+              </a:ext>
+            </a:extLst>
+          </p:cNvPr>
+          <p:cNvSpPr>
+            <a:spLocks noGrp="1"/>
+          </p:cNvSpPr>
+          <p:nvPr>
+            <p:ph type="subTitle" idx="1"/>
+          </p:nvPr>
+        </p:nvSpPr>
+        <p:spPr>
+          <a:xfrm>
+            <a:off x="1066802" y="1977542"/>
+            <a:ext cx="9814558" cy="4203801"/>
+          </a:xfrm>
         </p:spPr>
         <p:txBody>
           <a:bodyPr>
@@ -5221,8 +6031,8 @@
           <a:lstStyle/>
           <a:p>
             <a:r>
-              <a:rPr lang="en-US" sz="1600" dirty="0"/>
-              <a:t>Slide #</a:t>
+              <a:rPr lang="en-US" dirty="0"/>
+              <a:t>A</a:t>
             </a:r>
           </a:p>
         </p:txBody>
@@ -5240,7 +6050,7 @@
 </p:sld>
 </file>
 
-<file path=ppt/slides/slide5.xml><?xml version="1.0" encoding="utf-8"?>
+<file path=ppt/slides/slide6.xml><?xml version="1.0" encoding="utf-8"?>
 <p:sld xmlns:a="http://schemas.openxmlformats.org/drawingml/2006/main" xmlns:r="http://schemas.openxmlformats.org/officeDocument/2006/relationships" xmlns:p="http://schemas.openxmlformats.org/presentationml/2006/main">
   <p:cSld>
     <p:bg>
@@ -5490,7 +6300,7 @@
                   <a:srgbClr val="FFFFFF"/>
                 </a:solidFill>
               </a:rPr>
-              <a:t>American Health</a:t>
+              <a:t>Questions</a:t>
             </a:r>
           </a:p>
         </p:txBody>
@@ -5606,7 +6416,7 @@
 </p:sld>
 </file>
 
-<file path=ppt/slides/slide6.xml><?xml version="1.0" encoding="utf-8"?>
+<file path=ppt/slides/slide7.xml><?xml version="1.0" encoding="utf-8"?>
 <p:sld xmlns:a="http://schemas.openxmlformats.org/drawingml/2006/main" xmlns:r="http://schemas.openxmlformats.org/officeDocument/2006/relationships" xmlns:p="http://schemas.openxmlformats.org/presentationml/2006/main">
   <p:cSld>
     <p:bg>
@@ -5856,7 +6666,7 @@
                   <a:srgbClr val="FFFFFF"/>
                 </a:solidFill>
               </a:rPr>
-              <a:t>American Health</a:t>
+              <a:t>Our Procedure</a:t>
             </a:r>
           </a:p>
         </p:txBody>
@@ -5972,7 +6782,7 @@
 </p:sld>
 </file>
 
-<file path=ppt/slides/slide7.xml><?xml version="1.0" encoding="utf-8"?>
+<file path=ppt/slides/slide8.xml><?xml version="1.0" encoding="utf-8"?>
 <p:sld xmlns:a="http://schemas.openxmlformats.org/drawingml/2006/main" xmlns:r="http://schemas.openxmlformats.org/officeDocument/2006/relationships" xmlns:p="http://schemas.openxmlformats.org/presentationml/2006/main">
   <p:cSld>
     <p:bg>
@@ -6222,7 +7032,7 @@
                   <a:srgbClr val="FFFFFF"/>
                 </a:solidFill>
               </a:rPr>
-              <a:t>American Health</a:t>
+              <a:t>Results</a:t>
             </a:r>
           </a:p>
         </p:txBody>
@@ -6329,6 +7139,372 @@
     <p:extLst>
       <p:ext uri="{BB962C8B-B14F-4D97-AF65-F5344CB8AC3E}">
         <p14:creationId xmlns:p14="http://schemas.microsoft.com/office/powerpoint/2010/main" val="1706235225"/>
+      </p:ext>
+    </p:extLst>
+  </p:cSld>
+  <p:clrMapOvr>
+    <a:masterClrMapping/>
+  </p:clrMapOvr>
+</p:sld>
+</file>
+
+<file path=ppt/slides/slide9.xml><?xml version="1.0" encoding="utf-8"?>
+<p:sld xmlns:a="http://schemas.openxmlformats.org/drawingml/2006/main" xmlns:r="http://schemas.openxmlformats.org/officeDocument/2006/relationships" xmlns:p="http://schemas.openxmlformats.org/presentationml/2006/main">
+  <p:cSld>
+    <p:bg>
+      <p:bgPr>
+        <a:solidFill>
+          <a:schemeClr val="bg1"/>
+        </a:solidFill>
+        <a:effectLst/>
+      </p:bgPr>
+    </p:bg>
+    <p:spTree>
+      <p:nvGrpSpPr>
+        <p:cNvPr id="1" name="">
+          <a:extLst>
+            <a:ext uri="{FF2B5EF4-FFF2-40B4-BE49-F238E27FC236}">
+              <a16:creationId xmlns:a16="http://schemas.microsoft.com/office/drawing/2014/main" id="{4D20DD1A-1868-85B7-D088-936C5F926E6C}"/>
+            </a:ext>
+          </a:extLst>
+        </p:cNvPr>
+        <p:cNvGrpSpPr/>
+        <p:nvPr/>
+      </p:nvGrpSpPr>
+      <p:grpSpPr>
+        <a:xfrm>
+          <a:off x="0" y="0"/>
+          <a:ext cx="0" cy="0"/>
+          <a:chOff x="0" y="0"/>
+          <a:chExt cx="0" cy="0"/>
+        </a:xfrm>
+      </p:grpSpPr>
+      <p:sp useBgFill="1">
+        <p:nvSpPr>
+          <p:cNvPr id="60" name="Rectangle 59">
+            <a:extLst>
+              <a:ext uri="{FF2B5EF4-FFF2-40B4-BE49-F238E27FC236}">
+                <a16:creationId xmlns:a16="http://schemas.microsoft.com/office/drawing/2014/main" id="{7B8FBEB2-0054-DA25-A330-A0A3A79BD8D1}"/>
+              </a:ext>
+              <a:ext uri="{C183D7F6-B498-43B3-948B-1728B52AA6E4}">
+                <adec:decorative xmlns:adec="http://schemas.microsoft.com/office/drawing/2017/decorative" val="1"/>
+              </a:ext>
+            </a:extLst>
+          </p:cNvPr>
+          <p:cNvSpPr>
+            <a:spLocks noGrp="1" noRot="1" noChangeAspect="1" noMove="1" noResize="1" noEditPoints="1" noAdjustHandles="1" noChangeArrowheads="1" noChangeShapeType="1" noTextEdit="1"/>
+          </p:cNvSpPr>
+          <p:nvPr>
+            <p:extLst>
+              <p:ext uri="{386F3935-93C4-4BCD-93E2-E3B085C9AB24}">
+                <p16:designElem xmlns:p16="http://schemas.microsoft.com/office/powerpoint/2015/main" val="1"/>
+              </p:ext>
+            </p:extLst>
+          </p:nvPr>
+        </p:nvSpPr>
+        <p:spPr>
+          <a:xfrm>
+            <a:off x="0" y="0"/>
+            <a:ext cx="12192000" cy="6858000"/>
+          </a:xfrm>
+          <a:prstGeom prst="rect">
+            <a:avLst/>
+          </a:prstGeom>
+          <a:ln w="12700" cap="flat" cmpd="sng" algn="ctr">
+            <a:noFill/>
+            <a:prstDash val="solid"/>
+            <a:miter lim="800000"/>
+          </a:ln>
+          <a:effectLst/>
+          <a:extLst>
+            <a:ext uri="{91240B29-F687-4F45-9708-019B960494DF}">
+              <a14:hiddenLine xmlns:a14="http://schemas.microsoft.com/office/drawing/2010/main" w="12700" cap="flat" cmpd="sng" algn="ctr">
+                <a:solidFill>
+                  <a:schemeClr val="accent1">
+                    <a:shade val="50000"/>
+                  </a:schemeClr>
+                </a:solidFill>
+                <a:prstDash val="solid"/>
+                <a:miter lim="800000"/>
+              </a14:hiddenLine>
+            </a:ext>
+          </a:extLst>
+        </p:spPr>
+        <p:style>
+          <a:lnRef idx="2">
+            <a:schemeClr val="accent1">
+              <a:shade val="50000"/>
+            </a:schemeClr>
+          </a:lnRef>
+          <a:fillRef idx="1">
+            <a:schemeClr val="accent1"/>
+          </a:fillRef>
+          <a:effectRef idx="0">
+            <a:schemeClr val="accent1"/>
+          </a:effectRef>
+          <a:fontRef idx="minor">
+            <a:schemeClr val="lt1"/>
+          </a:fontRef>
+        </p:style>
+        <p:txBody>
+          <a:bodyPr rtlCol="0" anchor="ctr"/>
+          <a:lstStyle/>
+          <a:p>
+            <a:pPr algn="ctr"/>
+            <a:endParaRPr lang="en-US"/>
+          </a:p>
+        </p:txBody>
+      </p:sp>
+      <p:pic>
+        <p:nvPicPr>
+          <p:cNvPr id="53" name="Picture 52" descr="Vector background of vibrant colors splashing">
+            <a:extLst>
+              <a:ext uri="{FF2B5EF4-FFF2-40B4-BE49-F238E27FC236}">
+                <a16:creationId xmlns:a16="http://schemas.microsoft.com/office/drawing/2014/main" id="{BB2D6F8A-7758-85B7-DFCB-FC8D9A69DC83}"/>
+              </a:ext>
+            </a:extLst>
+          </p:cNvPr>
+          <p:cNvPicPr>
+            <a:picLocks noChangeAspect="1"/>
+          </p:cNvPicPr>
+          <p:nvPr/>
+        </p:nvPicPr>
+        <p:blipFill>
+          <a:blip r:embed="rId2"/>
+          <a:srcRect t="17279"/>
+          <a:stretch/>
+        </p:blipFill>
+        <p:spPr>
+          <a:xfrm>
+            <a:off x="-3" y="-3"/>
+            <a:ext cx="12191979" cy="6857989"/>
+          </a:xfrm>
+          <a:prstGeom prst="rect">
+            <a:avLst/>
+          </a:prstGeom>
+        </p:spPr>
+      </p:pic>
+      <p:sp>
+        <p:nvSpPr>
+          <p:cNvPr id="62" name="Rectangle 61">
+            <a:extLst>
+              <a:ext uri="{FF2B5EF4-FFF2-40B4-BE49-F238E27FC236}">
+                <a16:creationId xmlns:a16="http://schemas.microsoft.com/office/drawing/2014/main" id="{B02DFC4A-E42C-8EBD-025A-BE1B94B4099C}"/>
+              </a:ext>
+              <a:ext uri="{C183D7F6-B498-43B3-948B-1728B52AA6E4}">
+                <adec:decorative xmlns:adec="http://schemas.microsoft.com/office/drawing/2017/decorative" val="1"/>
+              </a:ext>
+            </a:extLst>
+          </p:cNvPr>
+          <p:cNvSpPr>
+            <a:spLocks noGrp="1" noRot="1" noChangeAspect="1" noMove="1" noResize="1" noEditPoints="1" noAdjustHandles="1" noChangeArrowheads="1" noChangeShapeType="1" noTextEdit="1"/>
+          </p:cNvSpPr>
+          <p:nvPr>
+            <p:extLst>
+              <p:ext uri="{386F3935-93C4-4BCD-93E2-E3B085C9AB24}">
+                <p16:designElem xmlns:p16="http://schemas.microsoft.com/office/powerpoint/2015/main" val="1"/>
+              </p:ext>
+            </p:extLst>
+          </p:nvPr>
+        </p:nvSpPr>
+        <p:spPr>
+          <a:xfrm rot="5400000">
+            <a:off x="960265" y="-960268"/>
+            <a:ext cx="6857998" cy="8778533"/>
+          </a:xfrm>
+          <a:prstGeom prst="rect">
+            <a:avLst/>
+          </a:prstGeom>
+          <a:gradFill>
+            <a:gsLst>
+              <a:gs pos="0">
+                <a:srgbClr val="000000">
+                  <a:alpha val="0"/>
+                </a:srgbClr>
+              </a:gs>
+              <a:gs pos="67900">
+                <a:srgbClr val="000000">
+                  <a:alpha val="33000"/>
+                </a:srgbClr>
+              </a:gs>
+              <a:gs pos="100000">
+                <a:srgbClr val="000000">
+                  <a:alpha val="52000"/>
+                </a:srgbClr>
+              </a:gs>
+            </a:gsLst>
+            <a:lin ang="5400000" scaled="1"/>
+          </a:gradFill>
+          <a:ln>
+            <a:noFill/>
+          </a:ln>
+        </p:spPr>
+        <p:style>
+          <a:lnRef idx="2">
+            <a:schemeClr val="accent1">
+              <a:shade val="50000"/>
+            </a:schemeClr>
+          </a:lnRef>
+          <a:fillRef idx="1">
+            <a:schemeClr val="accent1"/>
+          </a:fillRef>
+          <a:effectRef idx="0">
+            <a:schemeClr val="accent1"/>
+          </a:effectRef>
+          <a:fontRef idx="minor">
+            <a:schemeClr val="lt1"/>
+          </a:fontRef>
+        </p:style>
+        <p:txBody>
+          <a:bodyPr rtlCol="0" anchor="ctr"/>
+          <a:lstStyle/>
+          <a:p>
+            <a:pPr algn="ctr"/>
+            <a:endParaRPr lang="en-US"/>
+          </a:p>
+        </p:txBody>
+      </p:sp>
+      <p:sp>
+        <p:nvSpPr>
+          <p:cNvPr id="2" name="Title 1">
+            <a:extLst>
+              <a:ext uri="{FF2B5EF4-FFF2-40B4-BE49-F238E27FC236}">
+                <a16:creationId xmlns:a16="http://schemas.microsoft.com/office/drawing/2014/main" id="{E57529F5-C354-CF18-9381-EE544ACC1317}"/>
+              </a:ext>
+            </a:extLst>
+          </p:cNvPr>
+          <p:cNvSpPr>
+            <a:spLocks noGrp="1"/>
+          </p:cNvSpPr>
+          <p:nvPr>
+            <p:ph type="ctrTitle"/>
+          </p:nvPr>
+        </p:nvSpPr>
+        <p:spPr>
+          <a:xfrm>
+            <a:off x="1066802" y="-762072"/>
+            <a:ext cx="5029198" cy="2305246"/>
+          </a:xfrm>
+        </p:spPr>
+        <p:txBody>
+          <a:bodyPr>
+            <a:normAutofit/>
+          </a:bodyPr>
+          <a:lstStyle/>
+          <a:p>
+            <a:r>
+              <a:rPr lang="en-US" sz="4400" dirty="0">
+                <a:solidFill>
+                  <a:srgbClr val="FFFFFF"/>
+                </a:solidFill>
+              </a:rPr>
+              <a:t>Conclusion</a:t>
+            </a:r>
+          </a:p>
+        </p:txBody>
+      </p:sp>
+      <p:sp>
+        <p:nvSpPr>
+          <p:cNvPr id="4" name="Rectangle 3">
+            <a:extLst>
+              <a:ext uri="{FF2B5EF4-FFF2-40B4-BE49-F238E27FC236}">
+                <a16:creationId xmlns:a16="http://schemas.microsoft.com/office/drawing/2014/main" id="{0FEB77C7-ECE0-581A-B722-868E95B9B105}"/>
+              </a:ext>
+            </a:extLst>
+          </p:cNvPr>
+          <p:cNvSpPr/>
+          <p:nvPr/>
+        </p:nvSpPr>
+        <p:spPr>
+          <a:xfrm>
+            <a:off x="704850" y="1695450"/>
+            <a:ext cx="10563225" cy="4743450"/>
+          </a:xfrm>
+          <a:prstGeom prst="rect">
+            <a:avLst/>
+          </a:prstGeom>
+          <a:solidFill>
+            <a:schemeClr val="bg1"/>
+          </a:solidFill>
+          <a:ln>
+            <a:solidFill>
+              <a:schemeClr val="bg1"/>
+            </a:solidFill>
+          </a:ln>
+        </p:spPr>
+        <p:style>
+          <a:lnRef idx="2">
+            <a:schemeClr val="accent1">
+              <a:shade val="15000"/>
+            </a:schemeClr>
+          </a:lnRef>
+          <a:fillRef idx="1">
+            <a:schemeClr val="accent1"/>
+          </a:fillRef>
+          <a:effectRef idx="0">
+            <a:schemeClr val="accent1"/>
+          </a:effectRef>
+          <a:fontRef idx="minor">
+            <a:schemeClr val="lt1"/>
+          </a:fontRef>
+        </p:style>
+        <p:txBody>
+          <a:bodyPr rtlCol="0" anchor="ctr"/>
+          <a:lstStyle/>
+          <a:p>
+            <a:pPr algn="ctr"/>
+            <a:endParaRPr lang="en-US" dirty="0">
+              <a:ln>
+                <a:solidFill>
+                  <a:schemeClr val="bg1"/>
+                </a:solidFill>
+              </a:ln>
+              <a:solidFill>
+                <a:schemeClr val="bg1"/>
+              </a:solidFill>
+            </a:endParaRPr>
+          </a:p>
+        </p:txBody>
+      </p:sp>
+      <p:sp>
+        <p:nvSpPr>
+          <p:cNvPr id="3" name="Subtitle 2">
+            <a:extLst>
+              <a:ext uri="{FF2B5EF4-FFF2-40B4-BE49-F238E27FC236}">
+                <a16:creationId xmlns:a16="http://schemas.microsoft.com/office/drawing/2014/main" id="{41270F74-9157-D6D0-A622-9AAA111F4429}"/>
+              </a:ext>
+            </a:extLst>
+          </p:cNvPr>
+          <p:cNvSpPr>
+            <a:spLocks noGrp="1"/>
+          </p:cNvSpPr>
+          <p:nvPr>
+            <p:ph type="subTitle" idx="1"/>
+          </p:nvPr>
+        </p:nvSpPr>
+        <p:spPr>
+          <a:xfrm>
+            <a:off x="1066802" y="1977542"/>
+            <a:ext cx="9814558" cy="4203801"/>
+          </a:xfrm>
+        </p:spPr>
+        <p:txBody>
+          <a:bodyPr>
+            <a:normAutofit/>
+          </a:bodyPr>
+          <a:lstStyle/>
+          <a:p>
+            <a:r>
+              <a:rPr lang="en-US" sz="1600" dirty="0"/>
+              <a:t>Slide #</a:t>
+            </a:r>
+          </a:p>
+        </p:txBody>
+      </p:sp>
+    </p:spTree>
+    <p:extLst>
+      <p:ext uri="{BB962C8B-B14F-4D97-AF65-F5344CB8AC3E}">
+        <p14:creationId xmlns:p14="http://schemas.microsoft.com/office/powerpoint/2010/main" val="1116715139"/>
       </p:ext>
     </p:extLst>
   </p:cSld>

</xml_diff>

<commit_message>
added the rest of the slides: still needs conclusion
</commit_message>
<xml_diff>
--- a/American Health Final Presentation DS202.pptx
+++ b/American Health Final Presentation DS202.pptx
@@ -12,8 +12,12 @@
     <p:sldId id="264" r:id="rId6"/>
     <p:sldId id="265" r:id="rId7"/>
     <p:sldId id="266" r:id="rId8"/>
-    <p:sldId id="267" r:id="rId9"/>
-    <p:sldId id="268" r:id="rId10"/>
+    <p:sldId id="270" r:id="rId9"/>
+    <p:sldId id="271" r:id="rId10"/>
+    <p:sldId id="272" r:id="rId11"/>
+    <p:sldId id="273" r:id="rId12"/>
+    <p:sldId id="274" r:id="rId13"/>
+    <p:sldId id="268" r:id="rId14"/>
   </p:sldIdLst>
   <p:sldSz cx="12192000" cy="6858000"/>
   <p:notesSz cx="6858000" cy="9144000"/>
@@ -4149,6 +4153,1778 @@
 </p:sld>
 </file>
 
+<file path=ppt/slides/slide10.xml><?xml version="1.0" encoding="utf-8"?>
+<p:sld xmlns:a="http://schemas.openxmlformats.org/drawingml/2006/main" xmlns:r="http://schemas.openxmlformats.org/officeDocument/2006/relationships" xmlns:p="http://schemas.openxmlformats.org/presentationml/2006/main">
+  <p:cSld>
+    <p:bg>
+      <p:bgPr>
+        <a:solidFill>
+          <a:schemeClr val="bg1"/>
+        </a:solidFill>
+        <a:effectLst/>
+      </p:bgPr>
+    </p:bg>
+    <p:spTree>
+      <p:nvGrpSpPr>
+        <p:cNvPr id="1" name="">
+          <a:extLst>
+            <a:ext uri="{FF2B5EF4-FFF2-40B4-BE49-F238E27FC236}">
+              <a16:creationId xmlns:a16="http://schemas.microsoft.com/office/drawing/2014/main" id="{1C13F88B-2C3A-0588-1DA4-0085BF057977}"/>
+            </a:ext>
+          </a:extLst>
+        </p:cNvPr>
+        <p:cNvGrpSpPr/>
+        <p:nvPr/>
+      </p:nvGrpSpPr>
+      <p:grpSpPr>
+        <a:xfrm>
+          <a:off x="0" y="0"/>
+          <a:ext cx="0" cy="0"/>
+          <a:chOff x="0" y="0"/>
+          <a:chExt cx="0" cy="0"/>
+        </a:xfrm>
+      </p:grpSpPr>
+      <p:sp useBgFill="1">
+        <p:nvSpPr>
+          <p:cNvPr id="60" name="Rectangle 59">
+            <a:extLst>
+              <a:ext uri="{FF2B5EF4-FFF2-40B4-BE49-F238E27FC236}">
+                <a16:creationId xmlns:a16="http://schemas.microsoft.com/office/drawing/2014/main" id="{A8EEA0D1-DAD2-803D-7789-F0A343C6496A}"/>
+              </a:ext>
+              <a:ext uri="{C183D7F6-B498-43B3-948B-1728B52AA6E4}">
+                <adec:decorative xmlns:adec="http://schemas.microsoft.com/office/drawing/2017/decorative" val="1"/>
+              </a:ext>
+            </a:extLst>
+          </p:cNvPr>
+          <p:cNvSpPr>
+            <a:spLocks noGrp="1" noRot="1" noChangeAspect="1" noMove="1" noResize="1" noEditPoints="1" noAdjustHandles="1" noChangeArrowheads="1" noChangeShapeType="1" noTextEdit="1"/>
+          </p:cNvSpPr>
+          <p:nvPr>
+            <p:extLst>
+              <p:ext uri="{386F3935-93C4-4BCD-93E2-E3B085C9AB24}">
+                <p16:designElem xmlns:p16="http://schemas.microsoft.com/office/powerpoint/2015/main" val="1"/>
+              </p:ext>
+            </p:extLst>
+          </p:nvPr>
+        </p:nvSpPr>
+        <p:spPr>
+          <a:xfrm>
+            <a:off x="0" y="0"/>
+            <a:ext cx="12192000" cy="6858000"/>
+          </a:xfrm>
+          <a:prstGeom prst="rect">
+            <a:avLst/>
+          </a:prstGeom>
+          <a:ln w="12700" cap="flat" cmpd="sng" algn="ctr">
+            <a:noFill/>
+            <a:prstDash val="solid"/>
+            <a:miter lim="800000"/>
+          </a:ln>
+          <a:effectLst/>
+          <a:extLst>
+            <a:ext uri="{91240B29-F687-4F45-9708-019B960494DF}">
+              <a14:hiddenLine xmlns:a14="http://schemas.microsoft.com/office/drawing/2010/main" w="12700" cap="flat" cmpd="sng" algn="ctr">
+                <a:solidFill>
+                  <a:schemeClr val="accent1">
+                    <a:shade val="50000"/>
+                  </a:schemeClr>
+                </a:solidFill>
+                <a:prstDash val="solid"/>
+                <a:miter lim="800000"/>
+              </a14:hiddenLine>
+            </a:ext>
+          </a:extLst>
+        </p:spPr>
+        <p:style>
+          <a:lnRef idx="2">
+            <a:schemeClr val="accent1">
+              <a:shade val="50000"/>
+            </a:schemeClr>
+          </a:lnRef>
+          <a:fillRef idx="1">
+            <a:schemeClr val="accent1"/>
+          </a:fillRef>
+          <a:effectRef idx="0">
+            <a:schemeClr val="accent1"/>
+          </a:effectRef>
+          <a:fontRef idx="minor">
+            <a:schemeClr val="lt1"/>
+          </a:fontRef>
+        </p:style>
+        <p:txBody>
+          <a:bodyPr rtlCol="0" anchor="ctr"/>
+          <a:lstStyle/>
+          <a:p>
+            <a:pPr algn="ctr"/>
+            <a:endParaRPr lang="en-US"/>
+          </a:p>
+        </p:txBody>
+      </p:sp>
+      <p:pic>
+        <p:nvPicPr>
+          <p:cNvPr id="53" name="Picture 52" descr="Vector background of vibrant colors splashing">
+            <a:extLst>
+              <a:ext uri="{FF2B5EF4-FFF2-40B4-BE49-F238E27FC236}">
+                <a16:creationId xmlns:a16="http://schemas.microsoft.com/office/drawing/2014/main" id="{A41E8A6C-8F3E-8297-616E-C4996F406372}"/>
+              </a:ext>
+            </a:extLst>
+          </p:cNvPr>
+          <p:cNvPicPr>
+            <a:picLocks noChangeAspect="1"/>
+          </p:cNvPicPr>
+          <p:nvPr/>
+        </p:nvPicPr>
+        <p:blipFill>
+          <a:blip r:embed="rId2"/>
+          <a:srcRect t="17279"/>
+          <a:stretch/>
+        </p:blipFill>
+        <p:spPr>
+          <a:xfrm>
+            <a:off x="-3" y="-3"/>
+            <a:ext cx="12191979" cy="6857989"/>
+          </a:xfrm>
+          <a:prstGeom prst="rect">
+            <a:avLst/>
+          </a:prstGeom>
+        </p:spPr>
+      </p:pic>
+      <p:sp>
+        <p:nvSpPr>
+          <p:cNvPr id="62" name="Rectangle 61">
+            <a:extLst>
+              <a:ext uri="{FF2B5EF4-FFF2-40B4-BE49-F238E27FC236}">
+                <a16:creationId xmlns:a16="http://schemas.microsoft.com/office/drawing/2014/main" id="{5C88F9E4-8256-D571-0CF1-531846B71780}"/>
+              </a:ext>
+              <a:ext uri="{C183D7F6-B498-43B3-948B-1728B52AA6E4}">
+                <adec:decorative xmlns:adec="http://schemas.microsoft.com/office/drawing/2017/decorative" val="1"/>
+              </a:ext>
+            </a:extLst>
+          </p:cNvPr>
+          <p:cNvSpPr>
+            <a:spLocks noGrp="1" noRot="1" noChangeAspect="1" noMove="1" noResize="1" noEditPoints="1" noAdjustHandles="1" noChangeArrowheads="1" noChangeShapeType="1" noTextEdit="1"/>
+          </p:cNvSpPr>
+          <p:nvPr>
+            <p:extLst>
+              <p:ext uri="{386F3935-93C4-4BCD-93E2-E3B085C9AB24}">
+                <p16:designElem xmlns:p16="http://schemas.microsoft.com/office/powerpoint/2015/main" val="1"/>
+              </p:ext>
+            </p:extLst>
+          </p:nvPr>
+        </p:nvSpPr>
+        <p:spPr>
+          <a:xfrm rot="5400000">
+            <a:off x="960265" y="-960268"/>
+            <a:ext cx="6857998" cy="8778533"/>
+          </a:xfrm>
+          <a:prstGeom prst="rect">
+            <a:avLst/>
+          </a:prstGeom>
+          <a:gradFill>
+            <a:gsLst>
+              <a:gs pos="0">
+                <a:srgbClr val="000000">
+                  <a:alpha val="0"/>
+                </a:srgbClr>
+              </a:gs>
+              <a:gs pos="67900">
+                <a:srgbClr val="000000">
+                  <a:alpha val="33000"/>
+                </a:srgbClr>
+              </a:gs>
+              <a:gs pos="100000">
+                <a:srgbClr val="000000">
+                  <a:alpha val="52000"/>
+                </a:srgbClr>
+              </a:gs>
+            </a:gsLst>
+            <a:lin ang="5400000" scaled="1"/>
+          </a:gradFill>
+          <a:ln>
+            <a:noFill/>
+          </a:ln>
+        </p:spPr>
+        <p:style>
+          <a:lnRef idx="2">
+            <a:schemeClr val="accent1">
+              <a:shade val="50000"/>
+            </a:schemeClr>
+          </a:lnRef>
+          <a:fillRef idx="1">
+            <a:schemeClr val="accent1"/>
+          </a:fillRef>
+          <a:effectRef idx="0">
+            <a:schemeClr val="accent1"/>
+          </a:effectRef>
+          <a:fontRef idx="minor">
+            <a:schemeClr val="lt1"/>
+          </a:fontRef>
+        </p:style>
+        <p:txBody>
+          <a:bodyPr rtlCol="0" anchor="ctr"/>
+          <a:lstStyle/>
+          <a:p>
+            <a:pPr algn="ctr"/>
+            <a:endParaRPr lang="en-US"/>
+          </a:p>
+        </p:txBody>
+      </p:sp>
+      <p:sp>
+        <p:nvSpPr>
+          <p:cNvPr id="2" name="Title 1">
+            <a:extLst>
+              <a:ext uri="{FF2B5EF4-FFF2-40B4-BE49-F238E27FC236}">
+                <a16:creationId xmlns:a16="http://schemas.microsoft.com/office/drawing/2014/main" id="{A983DC77-5273-9AF6-2E92-C8E8A6995D97}"/>
+              </a:ext>
+            </a:extLst>
+          </p:cNvPr>
+          <p:cNvSpPr>
+            <a:spLocks noGrp="1"/>
+          </p:cNvSpPr>
+          <p:nvPr>
+            <p:ph type="ctrTitle"/>
+          </p:nvPr>
+        </p:nvSpPr>
+        <p:spPr>
+          <a:xfrm>
+            <a:off x="1066802" y="-762072"/>
+            <a:ext cx="5590030" cy="2305246"/>
+          </a:xfrm>
+        </p:spPr>
+        <p:txBody>
+          <a:bodyPr>
+            <a:normAutofit/>
+          </a:bodyPr>
+          <a:lstStyle/>
+          <a:p>
+            <a:r>
+              <a:rPr lang="en-US" sz="4400" dirty="0">
+                <a:solidFill>
+                  <a:srgbClr val="FFFFFF"/>
+                </a:solidFill>
+              </a:rPr>
+              <a:t>Results</a:t>
+            </a:r>
+          </a:p>
+        </p:txBody>
+      </p:sp>
+      <p:sp>
+        <p:nvSpPr>
+          <p:cNvPr id="4" name="Rectangle 3">
+            <a:extLst>
+              <a:ext uri="{FF2B5EF4-FFF2-40B4-BE49-F238E27FC236}">
+                <a16:creationId xmlns:a16="http://schemas.microsoft.com/office/drawing/2014/main" id="{BE0C7773-3F77-8813-3509-A0F166A6C0C6}"/>
+              </a:ext>
+            </a:extLst>
+          </p:cNvPr>
+          <p:cNvSpPr/>
+          <p:nvPr/>
+        </p:nvSpPr>
+        <p:spPr>
+          <a:xfrm>
+            <a:off x="704850" y="1695450"/>
+            <a:ext cx="10563225" cy="4743450"/>
+          </a:xfrm>
+          <a:prstGeom prst="rect">
+            <a:avLst/>
+          </a:prstGeom>
+          <a:solidFill>
+            <a:schemeClr val="bg1"/>
+          </a:solidFill>
+          <a:ln>
+            <a:solidFill>
+              <a:schemeClr val="bg1"/>
+            </a:solidFill>
+          </a:ln>
+        </p:spPr>
+        <p:style>
+          <a:lnRef idx="2">
+            <a:schemeClr val="accent1">
+              <a:shade val="15000"/>
+            </a:schemeClr>
+          </a:lnRef>
+          <a:fillRef idx="1">
+            <a:schemeClr val="accent1"/>
+          </a:fillRef>
+          <a:effectRef idx="0">
+            <a:schemeClr val="accent1"/>
+          </a:effectRef>
+          <a:fontRef idx="minor">
+            <a:schemeClr val="lt1"/>
+          </a:fontRef>
+        </p:style>
+        <p:txBody>
+          <a:bodyPr rtlCol="0" anchor="ctr"/>
+          <a:lstStyle/>
+          <a:p>
+            <a:pPr algn="ctr"/>
+            <a:endParaRPr lang="en-US" dirty="0">
+              <a:ln>
+                <a:solidFill>
+                  <a:schemeClr val="bg1"/>
+                </a:solidFill>
+              </a:ln>
+              <a:solidFill>
+                <a:schemeClr val="bg1"/>
+              </a:solidFill>
+            </a:endParaRPr>
+          </a:p>
+        </p:txBody>
+      </p:sp>
+      <p:sp>
+        <p:nvSpPr>
+          <p:cNvPr id="3" name="Subtitle 2">
+            <a:extLst>
+              <a:ext uri="{FF2B5EF4-FFF2-40B4-BE49-F238E27FC236}">
+                <a16:creationId xmlns:a16="http://schemas.microsoft.com/office/drawing/2014/main" id="{C633A20C-DB70-18BD-99CF-6F2322AE2D3B}"/>
+              </a:ext>
+            </a:extLst>
+          </p:cNvPr>
+          <p:cNvSpPr>
+            <a:spLocks noGrp="1"/>
+          </p:cNvSpPr>
+          <p:nvPr>
+            <p:ph type="subTitle" idx="1"/>
+          </p:nvPr>
+        </p:nvSpPr>
+        <p:spPr>
+          <a:xfrm>
+            <a:off x="1066802" y="1776374"/>
+            <a:ext cx="9814558" cy="4203801"/>
+          </a:xfrm>
+        </p:spPr>
+        <p:txBody>
+          <a:bodyPr>
+            <a:normAutofit/>
+          </a:bodyPr>
+          <a:lstStyle/>
+          <a:p>
+            <a:r>
+              <a:rPr lang="en-US" sz="1400" dirty="0"/>
+              <a:t>Question 2: What demographic factors (age, gender, income, education, race/ethnicity) are most associated with variations in health metrics?</a:t>
+            </a:r>
+          </a:p>
+          <a:p>
+            <a:endParaRPr lang="en-US" sz="2200" dirty="0"/>
+          </a:p>
+          <a:p>
+            <a:endParaRPr lang="en-US" dirty="0"/>
+          </a:p>
+        </p:txBody>
+      </p:sp>
+      <p:pic>
+        <p:nvPicPr>
+          <p:cNvPr id="6" name="Picture 5" descr="A graph of health questions&#10;&#10;Description automatically generated">
+            <a:extLst>
+              <a:ext uri="{FF2B5EF4-FFF2-40B4-BE49-F238E27FC236}">
+                <a16:creationId xmlns:a16="http://schemas.microsoft.com/office/drawing/2014/main" id="{AE10C13B-63E2-E042-E134-80B9CCD77B52}"/>
+              </a:ext>
+            </a:extLst>
+          </p:cNvPr>
+          <p:cNvPicPr>
+            <a:picLocks noChangeAspect="1"/>
+          </p:cNvPicPr>
+          <p:nvPr/>
+        </p:nvPicPr>
+        <p:blipFill>
+          <a:blip r:embed="rId3">
+            <a:extLst>
+              <a:ext uri="{28A0092B-C50C-407E-A947-70E740481C1C}">
+                <a14:useLocalDpi xmlns:a14="http://schemas.microsoft.com/office/drawing/2010/main" val="0"/>
+              </a:ext>
+            </a:extLst>
+          </a:blip>
+          <a:stretch>
+            <a:fillRect/>
+          </a:stretch>
+        </p:blipFill>
+        <p:spPr>
+          <a:xfrm>
+            <a:off x="1066778" y="2486778"/>
+            <a:ext cx="3468646" cy="2141512"/>
+          </a:xfrm>
+          <a:prstGeom prst="rect">
+            <a:avLst/>
+          </a:prstGeom>
+        </p:spPr>
+      </p:pic>
+      <p:pic>
+        <p:nvPicPr>
+          <p:cNvPr id="8" name="Picture 7">
+            <a:extLst>
+              <a:ext uri="{FF2B5EF4-FFF2-40B4-BE49-F238E27FC236}">
+                <a16:creationId xmlns:a16="http://schemas.microsoft.com/office/drawing/2014/main" id="{FD72670B-BE71-FD58-A166-92B761EF73C5}"/>
+              </a:ext>
+            </a:extLst>
+          </p:cNvPr>
+          <p:cNvPicPr>
+            <a:picLocks noChangeAspect="1"/>
+          </p:cNvPicPr>
+          <p:nvPr/>
+        </p:nvPicPr>
+        <p:blipFill>
+          <a:blip r:embed="rId4"/>
+          <a:stretch>
+            <a:fillRect/>
+          </a:stretch>
+        </p:blipFill>
+        <p:spPr>
+          <a:xfrm>
+            <a:off x="4726514" y="2486778"/>
+            <a:ext cx="5006279" cy="2021214"/>
+          </a:xfrm>
+          <a:prstGeom prst="rect">
+            <a:avLst/>
+          </a:prstGeom>
+        </p:spPr>
+      </p:pic>
+      <p:sp>
+        <p:nvSpPr>
+          <p:cNvPr id="9" name="Rectangle 8">
+            <a:extLst>
+              <a:ext uri="{FF2B5EF4-FFF2-40B4-BE49-F238E27FC236}">
+                <a16:creationId xmlns:a16="http://schemas.microsoft.com/office/drawing/2014/main" id="{42FC40CB-70E5-1397-80A1-0F4C8AE9F6EC}"/>
+              </a:ext>
+            </a:extLst>
+          </p:cNvPr>
+          <p:cNvSpPr/>
+          <p:nvPr/>
+        </p:nvSpPr>
+        <p:spPr>
+          <a:xfrm>
+            <a:off x="4997990" y="2265561"/>
+            <a:ext cx="4463325" cy="364334"/>
+          </a:xfrm>
+          <a:prstGeom prst="rect">
+            <a:avLst/>
+          </a:prstGeom>
+          <a:solidFill>
+            <a:schemeClr val="bg1"/>
+          </a:solidFill>
+          <a:ln>
+            <a:solidFill>
+              <a:schemeClr val="bg1"/>
+            </a:solidFill>
+          </a:ln>
+        </p:spPr>
+        <p:style>
+          <a:lnRef idx="2">
+            <a:schemeClr val="accent1">
+              <a:shade val="15000"/>
+            </a:schemeClr>
+          </a:lnRef>
+          <a:fillRef idx="1">
+            <a:schemeClr val="accent1"/>
+          </a:fillRef>
+          <a:effectRef idx="0">
+            <a:schemeClr val="accent1"/>
+          </a:effectRef>
+          <a:fontRef idx="minor">
+            <a:schemeClr val="lt1"/>
+          </a:fontRef>
+        </p:style>
+        <p:txBody>
+          <a:bodyPr rtlCol="0" anchor="ctr"/>
+          <a:lstStyle/>
+          <a:p>
+            <a:pPr algn="ctr"/>
+            <a:r>
+              <a:rPr lang="en-US" dirty="0">
+                <a:solidFill>
+                  <a:schemeClr val="tx1"/>
+                </a:solidFill>
+              </a:rPr>
+              <a:t>Highest obesity by characteristic</a:t>
+            </a:r>
+          </a:p>
+        </p:txBody>
+      </p:sp>
+    </p:spTree>
+    <p:extLst>
+      <p:ext uri="{BB962C8B-B14F-4D97-AF65-F5344CB8AC3E}">
+        <p14:creationId xmlns:p14="http://schemas.microsoft.com/office/powerpoint/2010/main" val="997958437"/>
+      </p:ext>
+    </p:extLst>
+  </p:cSld>
+  <p:clrMapOvr>
+    <a:masterClrMapping/>
+  </p:clrMapOvr>
+</p:sld>
+</file>
+
+<file path=ppt/slides/slide11.xml><?xml version="1.0" encoding="utf-8"?>
+<p:sld xmlns:a="http://schemas.openxmlformats.org/drawingml/2006/main" xmlns:r="http://schemas.openxmlformats.org/officeDocument/2006/relationships" xmlns:p="http://schemas.openxmlformats.org/presentationml/2006/main">
+  <p:cSld>
+    <p:bg>
+      <p:bgPr>
+        <a:solidFill>
+          <a:schemeClr val="bg1"/>
+        </a:solidFill>
+        <a:effectLst/>
+      </p:bgPr>
+    </p:bg>
+    <p:spTree>
+      <p:nvGrpSpPr>
+        <p:cNvPr id="1" name="">
+          <a:extLst>
+            <a:ext uri="{FF2B5EF4-FFF2-40B4-BE49-F238E27FC236}">
+              <a16:creationId xmlns:a16="http://schemas.microsoft.com/office/drawing/2014/main" id="{E81BAFDF-2EBB-BAA0-49F3-BF0130629E0C}"/>
+            </a:ext>
+          </a:extLst>
+        </p:cNvPr>
+        <p:cNvGrpSpPr/>
+        <p:nvPr/>
+      </p:nvGrpSpPr>
+      <p:grpSpPr>
+        <a:xfrm>
+          <a:off x="0" y="0"/>
+          <a:ext cx="0" cy="0"/>
+          <a:chOff x="0" y="0"/>
+          <a:chExt cx="0" cy="0"/>
+        </a:xfrm>
+      </p:grpSpPr>
+      <p:sp useBgFill="1">
+        <p:nvSpPr>
+          <p:cNvPr id="60" name="Rectangle 59">
+            <a:extLst>
+              <a:ext uri="{FF2B5EF4-FFF2-40B4-BE49-F238E27FC236}">
+                <a16:creationId xmlns:a16="http://schemas.microsoft.com/office/drawing/2014/main" id="{0340F768-6490-2B6C-7817-F7E9344FC5D9}"/>
+              </a:ext>
+              <a:ext uri="{C183D7F6-B498-43B3-948B-1728B52AA6E4}">
+                <adec:decorative xmlns:adec="http://schemas.microsoft.com/office/drawing/2017/decorative" val="1"/>
+              </a:ext>
+            </a:extLst>
+          </p:cNvPr>
+          <p:cNvSpPr>
+            <a:spLocks noGrp="1" noRot="1" noChangeAspect="1" noMove="1" noResize="1" noEditPoints="1" noAdjustHandles="1" noChangeArrowheads="1" noChangeShapeType="1" noTextEdit="1"/>
+          </p:cNvSpPr>
+          <p:nvPr>
+            <p:extLst>
+              <p:ext uri="{386F3935-93C4-4BCD-93E2-E3B085C9AB24}">
+                <p16:designElem xmlns:p16="http://schemas.microsoft.com/office/powerpoint/2015/main" val="1"/>
+              </p:ext>
+            </p:extLst>
+          </p:nvPr>
+        </p:nvSpPr>
+        <p:spPr>
+          <a:xfrm>
+            <a:off x="0" y="0"/>
+            <a:ext cx="12192000" cy="6858000"/>
+          </a:xfrm>
+          <a:prstGeom prst="rect">
+            <a:avLst/>
+          </a:prstGeom>
+          <a:ln w="12700" cap="flat" cmpd="sng" algn="ctr">
+            <a:noFill/>
+            <a:prstDash val="solid"/>
+            <a:miter lim="800000"/>
+          </a:ln>
+          <a:effectLst/>
+          <a:extLst>
+            <a:ext uri="{91240B29-F687-4F45-9708-019B960494DF}">
+              <a14:hiddenLine xmlns:a14="http://schemas.microsoft.com/office/drawing/2010/main" w="12700" cap="flat" cmpd="sng" algn="ctr">
+                <a:solidFill>
+                  <a:schemeClr val="accent1">
+                    <a:shade val="50000"/>
+                  </a:schemeClr>
+                </a:solidFill>
+                <a:prstDash val="solid"/>
+                <a:miter lim="800000"/>
+              </a14:hiddenLine>
+            </a:ext>
+          </a:extLst>
+        </p:spPr>
+        <p:style>
+          <a:lnRef idx="2">
+            <a:schemeClr val="accent1">
+              <a:shade val="50000"/>
+            </a:schemeClr>
+          </a:lnRef>
+          <a:fillRef idx="1">
+            <a:schemeClr val="accent1"/>
+          </a:fillRef>
+          <a:effectRef idx="0">
+            <a:schemeClr val="accent1"/>
+          </a:effectRef>
+          <a:fontRef idx="minor">
+            <a:schemeClr val="lt1"/>
+          </a:fontRef>
+        </p:style>
+        <p:txBody>
+          <a:bodyPr rtlCol="0" anchor="ctr"/>
+          <a:lstStyle/>
+          <a:p>
+            <a:pPr algn="ctr"/>
+            <a:endParaRPr lang="en-US"/>
+          </a:p>
+        </p:txBody>
+      </p:sp>
+      <p:pic>
+        <p:nvPicPr>
+          <p:cNvPr id="53" name="Picture 52" descr="Vector background of vibrant colors splashing">
+            <a:extLst>
+              <a:ext uri="{FF2B5EF4-FFF2-40B4-BE49-F238E27FC236}">
+                <a16:creationId xmlns:a16="http://schemas.microsoft.com/office/drawing/2014/main" id="{0C8267C3-3B1C-A237-0D29-C2104994B08A}"/>
+              </a:ext>
+            </a:extLst>
+          </p:cNvPr>
+          <p:cNvPicPr>
+            <a:picLocks noChangeAspect="1"/>
+          </p:cNvPicPr>
+          <p:nvPr/>
+        </p:nvPicPr>
+        <p:blipFill>
+          <a:blip r:embed="rId2"/>
+          <a:srcRect t="17279"/>
+          <a:stretch/>
+        </p:blipFill>
+        <p:spPr>
+          <a:xfrm>
+            <a:off x="-3" y="-3"/>
+            <a:ext cx="12191979" cy="6857989"/>
+          </a:xfrm>
+          <a:prstGeom prst="rect">
+            <a:avLst/>
+          </a:prstGeom>
+        </p:spPr>
+      </p:pic>
+      <p:sp>
+        <p:nvSpPr>
+          <p:cNvPr id="62" name="Rectangle 61">
+            <a:extLst>
+              <a:ext uri="{FF2B5EF4-FFF2-40B4-BE49-F238E27FC236}">
+                <a16:creationId xmlns:a16="http://schemas.microsoft.com/office/drawing/2014/main" id="{73EE8F62-EA79-B22D-5761-197C3E4E9EBA}"/>
+              </a:ext>
+              <a:ext uri="{C183D7F6-B498-43B3-948B-1728B52AA6E4}">
+                <adec:decorative xmlns:adec="http://schemas.microsoft.com/office/drawing/2017/decorative" val="1"/>
+              </a:ext>
+            </a:extLst>
+          </p:cNvPr>
+          <p:cNvSpPr>
+            <a:spLocks noGrp="1" noRot="1" noChangeAspect="1" noMove="1" noResize="1" noEditPoints="1" noAdjustHandles="1" noChangeArrowheads="1" noChangeShapeType="1" noTextEdit="1"/>
+          </p:cNvSpPr>
+          <p:nvPr>
+            <p:extLst>
+              <p:ext uri="{386F3935-93C4-4BCD-93E2-E3B085C9AB24}">
+                <p16:designElem xmlns:p16="http://schemas.microsoft.com/office/powerpoint/2015/main" val="1"/>
+              </p:ext>
+            </p:extLst>
+          </p:nvPr>
+        </p:nvSpPr>
+        <p:spPr>
+          <a:xfrm rot="5400000">
+            <a:off x="960265" y="-960268"/>
+            <a:ext cx="6857998" cy="8778533"/>
+          </a:xfrm>
+          <a:prstGeom prst="rect">
+            <a:avLst/>
+          </a:prstGeom>
+          <a:gradFill>
+            <a:gsLst>
+              <a:gs pos="0">
+                <a:srgbClr val="000000">
+                  <a:alpha val="0"/>
+                </a:srgbClr>
+              </a:gs>
+              <a:gs pos="67900">
+                <a:srgbClr val="000000">
+                  <a:alpha val="33000"/>
+                </a:srgbClr>
+              </a:gs>
+              <a:gs pos="100000">
+                <a:srgbClr val="000000">
+                  <a:alpha val="52000"/>
+                </a:srgbClr>
+              </a:gs>
+            </a:gsLst>
+            <a:lin ang="5400000" scaled="1"/>
+          </a:gradFill>
+          <a:ln>
+            <a:noFill/>
+          </a:ln>
+        </p:spPr>
+        <p:style>
+          <a:lnRef idx="2">
+            <a:schemeClr val="accent1">
+              <a:shade val="50000"/>
+            </a:schemeClr>
+          </a:lnRef>
+          <a:fillRef idx="1">
+            <a:schemeClr val="accent1"/>
+          </a:fillRef>
+          <a:effectRef idx="0">
+            <a:schemeClr val="accent1"/>
+          </a:effectRef>
+          <a:fontRef idx="minor">
+            <a:schemeClr val="lt1"/>
+          </a:fontRef>
+        </p:style>
+        <p:txBody>
+          <a:bodyPr rtlCol="0" anchor="ctr"/>
+          <a:lstStyle/>
+          <a:p>
+            <a:pPr algn="ctr"/>
+            <a:endParaRPr lang="en-US"/>
+          </a:p>
+        </p:txBody>
+      </p:sp>
+      <p:sp>
+        <p:nvSpPr>
+          <p:cNvPr id="2" name="Title 1">
+            <a:extLst>
+              <a:ext uri="{FF2B5EF4-FFF2-40B4-BE49-F238E27FC236}">
+                <a16:creationId xmlns:a16="http://schemas.microsoft.com/office/drawing/2014/main" id="{8CF2228E-505F-673F-7884-A992257DAF02}"/>
+              </a:ext>
+            </a:extLst>
+          </p:cNvPr>
+          <p:cNvSpPr>
+            <a:spLocks noGrp="1"/>
+          </p:cNvSpPr>
+          <p:nvPr>
+            <p:ph type="ctrTitle"/>
+          </p:nvPr>
+        </p:nvSpPr>
+        <p:spPr>
+          <a:xfrm>
+            <a:off x="1066802" y="-762072"/>
+            <a:ext cx="5590030" cy="2305246"/>
+          </a:xfrm>
+        </p:spPr>
+        <p:txBody>
+          <a:bodyPr>
+            <a:normAutofit/>
+          </a:bodyPr>
+          <a:lstStyle/>
+          <a:p>
+            <a:r>
+              <a:rPr lang="en-US" sz="4400" dirty="0">
+                <a:solidFill>
+                  <a:srgbClr val="FFFFFF"/>
+                </a:solidFill>
+              </a:rPr>
+              <a:t>Results</a:t>
+            </a:r>
+          </a:p>
+        </p:txBody>
+      </p:sp>
+      <p:sp>
+        <p:nvSpPr>
+          <p:cNvPr id="4" name="Rectangle 3">
+            <a:extLst>
+              <a:ext uri="{FF2B5EF4-FFF2-40B4-BE49-F238E27FC236}">
+                <a16:creationId xmlns:a16="http://schemas.microsoft.com/office/drawing/2014/main" id="{AF0EC364-23AD-D54E-1727-0317486289D0}"/>
+              </a:ext>
+            </a:extLst>
+          </p:cNvPr>
+          <p:cNvSpPr/>
+          <p:nvPr/>
+        </p:nvSpPr>
+        <p:spPr>
+          <a:xfrm>
+            <a:off x="704850" y="1695450"/>
+            <a:ext cx="10563225" cy="4743450"/>
+          </a:xfrm>
+          <a:prstGeom prst="rect">
+            <a:avLst/>
+          </a:prstGeom>
+          <a:solidFill>
+            <a:schemeClr val="bg1"/>
+          </a:solidFill>
+          <a:ln>
+            <a:solidFill>
+              <a:schemeClr val="bg1"/>
+            </a:solidFill>
+          </a:ln>
+        </p:spPr>
+        <p:style>
+          <a:lnRef idx="2">
+            <a:schemeClr val="accent1">
+              <a:shade val="15000"/>
+            </a:schemeClr>
+          </a:lnRef>
+          <a:fillRef idx="1">
+            <a:schemeClr val="accent1"/>
+          </a:fillRef>
+          <a:effectRef idx="0">
+            <a:schemeClr val="accent1"/>
+          </a:effectRef>
+          <a:fontRef idx="minor">
+            <a:schemeClr val="lt1"/>
+          </a:fontRef>
+        </p:style>
+        <p:txBody>
+          <a:bodyPr rtlCol="0" anchor="ctr"/>
+          <a:lstStyle/>
+          <a:p>
+            <a:pPr algn="ctr"/>
+            <a:endParaRPr lang="en-US" dirty="0">
+              <a:ln>
+                <a:solidFill>
+                  <a:schemeClr val="bg1"/>
+                </a:solidFill>
+              </a:ln>
+              <a:solidFill>
+                <a:schemeClr val="bg1"/>
+              </a:solidFill>
+            </a:endParaRPr>
+          </a:p>
+        </p:txBody>
+      </p:sp>
+      <p:sp>
+        <p:nvSpPr>
+          <p:cNvPr id="3" name="Subtitle 2">
+            <a:extLst>
+              <a:ext uri="{FF2B5EF4-FFF2-40B4-BE49-F238E27FC236}">
+                <a16:creationId xmlns:a16="http://schemas.microsoft.com/office/drawing/2014/main" id="{85E33CD4-D0FC-2FC4-6F38-33BCA14B3BFE}"/>
+              </a:ext>
+            </a:extLst>
+          </p:cNvPr>
+          <p:cNvSpPr>
+            <a:spLocks noGrp="1"/>
+          </p:cNvSpPr>
+          <p:nvPr>
+            <p:ph type="subTitle" idx="1"/>
+          </p:nvPr>
+        </p:nvSpPr>
+        <p:spPr>
+          <a:xfrm>
+            <a:off x="1066802" y="1776374"/>
+            <a:ext cx="9814558" cy="4203801"/>
+          </a:xfrm>
+        </p:spPr>
+        <p:txBody>
+          <a:bodyPr>
+            <a:normAutofit/>
+          </a:bodyPr>
+          <a:lstStyle/>
+          <a:p>
+            <a:r>
+              <a:rPr lang="en-US" sz="1400" dirty="0"/>
+              <a:t>Question 3: Have there been significant changes over time in key metrics like obesity?</a:t>
+            </a:r>
+          </a:p>
+          <a:p>
+            <a:endParaRPr lang="en-US" sz="2200" dirty="0"/>
+          </a:p>
+          <a:p>
+            <a:endParaRPr lang="en-US" dirty="0"/>
+          </a:p>
+        </p:txBody>
+      </p:sp>
+      <p:pic>
+        <p:nvPicPr>
+          <p:cNvPr id="6" name="Picture 5" descr="A graph with orange and purple dots&#10;&#10;Description automatically generated">
+            <a:extLst>
+              <a:ext uri="{FF2B5EF4-FFF2-40B4-BE49-F238E27FC236}">
+                <a16:creationId xmlns:a16="http://schemas.microsoft.com/office/drawing/2014/main" id="{1F0F53A2-EDAE-C508-422D-4E79BAADB281}"/>
+              </a:ext>
+            </a:extLst>
+          </p:cNvPr>
+          <p:cNvPicPr>
+            <a:picLocks noChangeAspect="1"/>
+          </p:cNvPicPr>
+          <p:nvPr/>
+        </p:nvPicPr>
+        <p:blipFill>
+          <a:blip r:embed="rId3">
+            <a:extLst>
+              <a:ext uri="{28A0092B-C50C-407E-A947-70E740481C1C}">
+                <a14:useLocalDpi xmlns:a14="http://schemas.microsoft.com/office/drawing/2010/main" val="0"/>
+              </a:ext>
+            </a:extLst>
+          </a:blip>
+          <a:stretch>
+            <a:fillRect/>
+          </a:stretch>
+        </p:blipFill>
+        <p:spPr>
+          <a:xfrm>
+            <a:off x="1102680" y="2222852"/>
+            <a:ext cx="6573167" cy="4058216"/>
+          </a:xfrm>
+          <a:prstGeom prst="rect">
+            <a:avLst/>
+          </a:prstGeom>
+        </p:spPr>
+      </p:pic>
+    </p:spTree>
+    <p:extLst>
+      <p:ext uri="{BB962C8B-B14F-4D97-AF65-F5344CB8AC3E}">
+        <p14:creationId xmlns:p14="http://schemas.microsoft.com/office/powerpoint/2010/main" val="742846537"/>
+      </p:ext>
+    </p:extLst>
+  </p:cSld>
+  <p:clrMapOvr>
+    <a:masterClrMapping/>
+  </p:clrMapOvr>
+</p:sld>
+</file>
+
+<file path=ppt/slides/slide12.xml><?xml version="1.0" encoding="utf-8"?>
+<p:sld xmlns:a="http://schemas.openxmlformats.org/drawingml/2006/main" xmlns:r="http://schemas.openxmlformats.org/officeDocument/2006/relationships" xmlns:p="http://schemas.openxmlformats.org/presentationml/2006/main">
+  <p:cSld>
+    <p:bg>
+      <p:bgPr>
+        <a:solidFill>
+          <a:schemeClr val="bg1"/>
+        </a:solidFill>
+        <a:effectLst/>
+      </p:bgPr>
+    </p:bg>
+    <p:spTree>
+      <p:nvGrpSpPr>
+        <p:cNvPr id="1" name="">
+          <a:extLst>
+            <a:ext uri="{FF2B5EF4-FFF2-40B4-BE49-F238E27FC236}">
+              <a16:creationId xmlns:a16="http://schemas.microsoft.com/office/drawing/2014/main" id="{42CBC204-E9C0-70F0-C437-1FB457FD7C1C}"/>
+            </a:ext>
+          </a:extLst>
+        </p:cNvPr>
+        <p:cNvGrpSpPr/>
+        <p:nvPr/>
+      </p:nvGrpSpPr>
+      <p:grpSpPr>
+        <a:xfrm>
+          <a:off x="0" y="0"/>
+          <a:ext cx="0" cy="0"/>
+          <a:chOff x="0" y="0"/>
+          <a:chExt cx="0" cy="0"/>
+        </a:xfrm>
+      </p:grpSpPr>
+      <p:sp useBgFill="1">
+        <p:nvSpPr>
+          <p:cNvPr id="60" name="Rectangle 59">
+            <a:extLst>
+              <a:ext uri="{FF2B5EF4-FFF2-40B4-BE49-F238E27FC236}">
+                <a16:creationId xmlns:a16="http://schemas.microsoft.com/office/drawing/2014/main" id="{106070C0-97D4-7BDC-7CA7-137023DA0B36}"/>
+              </a:ext>
+              <a:ext uri="{C183D7F6-B498-43B3-948B-1728B52AA6E4}">
+                <adec:decorative xmlns:adec="http://schemas.microsoft.com/office/drawing/2017/decorative" val="1"/>
+              </a:ext>
+            </a:extLst>
+          </p:cNvPr>
+          <p:cNvSpPr>
+            <a:spLocks noGrp="1" noRot="1" noChangeAspect="1" noMove="1" noResize="1" noEditPoints="1" noAdjustHandles="1" noChangeArrowheads="1" noChangeShapeType="1" noTextEdit="1"/>
+          </p:cNvSpPr>
+          <p:nvPr>
+            <p:extLst>
+              <p:ext uri="{386F3935-93C4-4BCD-93E2-E3B085C9AB24}">
+                <p16:designElem xmlns:p16="http://schemas.microsoft.com/office/powerpoint/2015/main" val="1"/>
+              </p:ext>
+            </p:extLst>
+          </p:nvPr>
+        </p:nvSpPr>
+        <p:spPr>
+          <a:xfrm>
+            <a:off x="0" y="0"/>
+            <a:ext cx="12192000" cy="6858000"/>
+          </a:xfrm>
+          <a:prstGeom prst="rect">
+            <a:avLst/>
+          </a:prstGeom>
+          <a:ln w="12700" cap="flat" cmpd="sng" algn="ctr">
+            <a:noFill/>
+            <a:prstDash val="solid"/>
+            <a:miter lim="800000"/>
+          </a:ln>
+          <a:effectLst/>
+          <a:extLst>
+            <a:ext uri="{91240B29-F687-4F45-9708-019B960494DF}">
+              <a14:hiddenLine xmlns:a14="http://schemas.microsoft.com/office/drawing/2010/main" w="12700" cap="flat" cmpd="sng" algn="ctr">
+                <a:solidFill>
+                  <a:schemeClr val="accent1">
+                    <a:shade val="50000"/>
+                  </a:schemeClr>
+                </a:solidFill>
+                <a:prstDash val="solid"/>
+                <a:miter lim="800000"/>
+              </a14:hiddenLine>
+            </a:ext>
+          </a:extLst>
+        </p:spPr>
+        <p:style>
+          <a:lnRef idx="2">
+            <a:schemeClr val="accent1">
+              <a:shade val="50000"/>
+            </a:schemeClr>
+          </a:lnRef>
+          <a:fillRef idx="1">
+            <a:schemeClr val="accent1"/>
+          </a:fillRef>
+          <a:effectRef idx="0">
+            <a:schemeClr val="accent1"/>
+          </a:effectRef>
+          <a:fontRef idx="minor">
+            <a:schemeClr val="lt1"/>
+          </a:fontRef>
+        </p:style>
+        <p:txBody>
+          <a:bodyPr rtlCol="0" anchor="ctr"/>
+          <a:lstStyle/>
+          <a:p>
+            <a:pPr algn="ctr"/>
+            <a:endParaRPr lang="en-US"/>
+          </a:p>
+        </p:txBody>
+      </p:sp>
+      <p:pic>
+        <p:nvPicPr>
+          <p:cNvPr id="53" name="Picture 52" descr="Vector background of vibrant colors splashing">
+            <a:extLst>
+              <a:ext uri="{FF2B5EF4-FFF2-40B4-BE49-F238E27FC236}">
+                <a16:creationId xmlns:a16="http://schemas.microsoft.com/office/drawing/2014/main" id="{705FE74C-2EB7-21D5-0398-F617E262C5E8}"/>
+              </a:ext>
+            </a:extLst>
+          </p:cNvPr>
+          <p:cNvPicPr>
+            <a:picLocks noChangeAspect="1"/>
+          </p:cNvPicPr>
+          <p:nvPr/>
+        </p:nvPicPr>
+        <p:blipFill>
+          <a:blip r:embed="rId2"/>
+          <a:srcRect t="17279"/>
+          <a:stretch/>
+        </p:blipFill>
+        <p:spPr>
+          <a:xfrm>
+            <a:off x="-3" y="-3"/>
+            <a:ext cx="12191979" cy="6857989"/>
+          </a:xfrm>
+          <a:prstGeom prst="rect">
+            <a:avLst/>
+          </a:prstGeom>
+        </p:spPr>
+      </p:pic>
+      <p:sp>
+        <p:nvSpPr>
+          <p:cNvPr id="62" name="Rectangle 61">
+            <a:extLst>
+              <a:ext uri="{FF2B5EF4-FFF2-40B4-BE49-F238E27FC236}">
+                <a16:creationId xmlns:a16="http://schemas.microsoft.com/office/drawing/2014/main" id="{B5845296-D6B0-9FD6-4A5B-222B593B5F14}"/>
+              </a:ext>
+              <a:ext uri="{C183D7F6-B498-43B3-948B-1728B52AA6E4}">
+                <adec:decorative xmlns:adec="http://schemas.microsoft.com/office/drawing/2017/decorative" val="1"/>
+              </a:ext>
+            </a:extLst>
+          </p:cNvPr>
+          <p:cNvSpPr>
+            <a:spLocks noGrp="1" noRot="1" noChangeAspect="1" noMove="1" noResize="1" noEditPoints="1" noAdjustHandles="1" noChangeArrowheads="1" noChangeShapeType="1" noTextEdit="1"/>
+          </p:cNvSpPr>
+          <p:nvPr>
+            <p:extLst>
+              <p:ext uri="{386F3935-93C4-4BCD-93E2-E3B085C9AB24}">
+                <p16:designElem xmlns:p16="http://schemas.microsoft.com/office/powerpoint/2015/main" val="1"/>
+              </p:ext>
+            </p:extLst>
+          </p:nvPr>
+        </p:nvSpPr>
+        <p:spPr>
+          <a:xfrm rot="5400000">
+            <a:off x="960265" y="-960268"/>
+            <a:ext cx="6857998" cy="8778533"/>
+          </a:xfrm>
+          <a:prstGeom prst="rect">
+            <a:avLst/>
+          </a:prstGeom>
+          <a:gradFill>
+            <a:gsLst>
+              <a:gs pos="0">
+                <a:srgbClr val="000000">
+                  <a:alpha val="0"/>
+                </a:srgbClr>
+              </a:gs>
+              <a:gs pos="67900">
+                <a:srgbClr val="000000">
+                  <a:alpha val="33000"/>
+                </a:srgbClr>
+              </a:gs>
+              <a:gs pos="100000">
+                <a:srgbClr val="000000">
+                  <a:alpha val="52000"/>
+                </a:srgbClr>
+              </a:gs>
+            </a:gsLst>
+            <a:lin ang="5400000" scaled="1"/>
+          </a:gradFill>
+          <a:ln>
+            <a:noFill/>
+          </a:ln>
+        </p:spPr>
+        <p:style>
+          <a:lnRef idx="2">
+            <a:schemeClr val="accent1">
+              <a:shade val="50000"/>
+            </a:schemeClr>
+          </a:lnRef>
+          <a:fillRef idx="1">
+            <a:schemeClr val="accent1"/>
+          </a:fillRef>
+          <a:effectRef idx="0">
+            <a:schemeClr val="accent1"/>
+          </a:effectRef>
+          <a:fontRef idx="minor">
+            <a:schemeClr val="lt1"/>
+          </a:fontRef>
+        </p:style>
+        <p:txBody>
+          <a:bodyPr rtlCol="0" anchor="ctr"/>
+          <a:lstStyle/>
+          <a:p>
+            <a:pPr algn="ctr"/>
+            <a:endParaRPr lang="en-US"/>
+          </a:p>
+        </p:txBody>
+      </p:sp>
+      <p:sp>
+        <p:nvSpPr>
+          <p:cNvPr id="2" name="Title 1">
+            <a:extLst>
+              <a:ext uri="{FF2B5EF4-FFF2-40B4-BE49-F238E27FC236}">
+                <a16:creationId xmlns:a16="http://schemas.microsoft.com/office/drawing/2014/main" id="{6C9A5A5C-3D57-9EC2-10BA-54CD1A388447}"/>
+              </a:ext>
+            </a:extLst>
+          </p:cNvPr>
+          <p:cNvSpPr>
+            <a:spLocks noGrp="1"/>
+          </p:cNvSpPr>
+          <p:nvPr>
+            <p:ph type="ctrTitle"/>
+          </p:nvPr>
+        </p:nvSpPr>
+        <p:spPr>
+          <a:xfrm>
+            <a:off x="1066802" y="-762072"/>
+            <a:ext cx="5590030" cy="2305246"/>
+          </a:xfrm>
+        </p:spPr>
+        <p:txBody>
+          <a:bodyPr>
+            <a:normAutofit/>
+          </a:bodyPr>
+          <a:lstStyle/>
+          <a:p>
+            <a:r>
+              <a:rPr lang="en-US" sz="4400" dirty="0">
+                <a:solidFill>
+                  <a:srgbClr val="FFFFFF"/>
+                </a:solidFill>
+              </a:rPr>
+              <a:t>Results</a:t>
+            </a:r>
+          </a:p>
+        </p:txBody>
+      </p:sp>
+      <p:sp>
+        <p:nvSpPr>
+          <p:cNvPr id="4" name="Rectangle 3">
+            <a:extLst>
+              <a:ext uri="{FF2B5EF4-FFF2-40B4-BE49-F238E27FC236}">
+                <a16:creationId xmlns:a16="http://schemas.microsoft.com/office/drawing/2014/main" id="{7591A244-A313-0CC2-06D7-98829D08B179}"/>
+              </a:ext>
+            </a:extLst>
+          </p:cNvPr>
+          <p:cNvSpPr/>
+          <p:nvPr/>
+        </p:nvSpPr>
+        <p:spPr>
+          <a:xfrm>
+            <a:off x="704850" y="1695450"/>
+            <a:ext cx="10563225" cy="4743450"/>
+          </a:xfrm>
+          <a:prstGeom prst="rect">
+            <a:avLst/>
+          </a:prstGeom>
+          <a:solidFill>
+            <a:schemeClr val="bg1"/>
+          </a:solidFill>
+          <a:ln>
+            <a:solidFill>
+              <a:schemeClr val="bg1"/>
+            </a:solidFill>
+          </a:ln>
+        </p:spPr>
+        <p:style>
+          <a:lnRef idx="2">
+            <a:schemeClr val="accent1">
+              <a:shade val="15000"/>
+            </a:schemeClr>
+          </a:lnRef>
+          <a:fillRef idx="1">
+            <a:schemeClr val="accent1"/>
+          </a:fillRef>
+          <a:effectRef idx="0">
+            <a:schemeClr val="accent1"/>
+          </a:effectRef>
+          <a:fontRef idx="minor">
+            <a:schemeClr val="lt1"/>
+          </a:fontRef>
+        </p:style>
+        <p:txBody>
+          <a:bodyPr rtlCol="0" anchor="ctr"/>
+          <a:lstStyle/>
+          <a:p>
+            <a:pPr algn="ctr"/>
+            <a:endParaRPr lang="en-US" dirty="0">
+              <a:ln>
+                <a:solidFill>
+                  <a:schemeClr val="bg1"/>
+                </a:solidFill>
+              </a:ln>
+              <a:solidFill>
+                <a:schemeClr val="bg1"/>
+              </a:solidFill>
+            </a:endParaRPr>
+          </a:p>
+        </p:txBody>
+      </p:sp>
+      <p:sp>
+        <p:nvSpPr>
+          <p:cNvPr id="3" name="Subtitle 2">
+            <a:extLst>
+              <a:ext uri="{FF2B5EF4-FFF2-40B4-BE49-F238E27FC236}">
+                <a16:creationId xmlns:a16="http://schemas.microsoft.com/office/drawing/2014/main" id="{EF5F72DB-5512-2A88-8450-414117719025}"/>
+              </a:ext>
+            </a:extLst>
+          </p:cNvPr>
+          <p:cNvSpPr>
+            <a:spLocks noGrp="1"/>
+          </p:cNvSpPr>
+          <p:nvPr>
+            <p:ph type="subTitle" idx="1"/>
+          </p:nvPr>
+        </p:nvSpPr>
+        <p:spPr>
+          <a:xfrm>
+            <a:off x="1066802" y="1776374"/>
+            <a:ext cx="9814558" cy="4203801"/>
+          </a:xfrm>
+        </p:spPr>
+        <p:txBody>
+          <a:bodyPr>
+            <a:normAutofit/>
+          </a:bodyPr>
+          <a:lstStyle/>
+          <a:p>
+            <a:r>
+              <a:rPr lang="en-US" sz="1400" dirty="0"/>
+              <a:t>Question 4: What is the relationship between socioeconomic status (e.g., income, education) and health measures like obesity and physical activity?</a:t>
+            </a:r>
+          </a:p>
+          <a:p>
+            <a:endParaRPr lang="en-US" sz="2200" dirty="0"/>
+          </a:p>
+          <a:p>
+            <a:endParaRPr lang="en-US" dirty="0"/>
+          </a:p>
+        </p:txBody>
+      </p:sp>
+      <p:pic>
+        <p:nvPicPr>
+          <p:cNvPr id="6" name="Picture 5" descr="A graph with a row of rectangular objects&#10;&#10;Description automatically generated with medium confidence">
+            <a:extLst>
+              <a:ext uri="{FF2B5EF4-FFF2-40B4-BE49-F238E27FC236}">
+                <a16:creationId xmlns:a16="http://schemas.microsoft.com/office/drawing/2014/main" id="{340B588C-0FBE-0FD8-DDE0-1727587F13A6}"/>
+              </a:ext>
+            </a:extLst>
+          </p:cNvPr>
+          <p:cNvPicPr>
+            <a:picLocks noChangeAspect="1"/>
+          </p:cNvPicPr>
+          <p:nvPr/>
+        </p:nvPicPr>
+        <p:blipFill>
+          <a:blip r:embed="rId3">
+            <a:extLst>
+              <a:ext uri="{28A0092B-C50C-407E-A947-70E740481C1C}">
+                <a14:useLocalDpi xmlns:a14="http://schemas.microsoft.com/office/drawing/2010/main" val="0"/>
+              </a:ext>
+            </a:extLst>
+          </a:blip>
+          <a:stretch>
+            <a:fillRect/>
+          </a:stretch>
+        </p:blipFill>
+        <p:spPr>
+          <a:xfrm>
+            <a:off x="1302537" y="2605272"/>
+            <a:ext cx="4735741" cy="2923805"/>
+          </a:xfrm>
+          <a:prstGeom prst="rect">
+            <a:avLst/>
+          </a:prstGeom>
+        </p:spPr>
+      </p:pic>
+      <p:pic>
+        <p:nvPicPr>
+          <p:cNvPr id="8" name="Picture 7">
+            <a:extLst>
+              <a:ext uri="{FF2B5EF4-FFF2-40B4-BE49-F238E27FC236}">
+                <a16:creationId xmlns:a16="http://schemas.microsoft.com/office/drawing/2014/main" id="{72003EBD-19B7-CF19-46FE-8AFD9C2B9392}"/>
+              </a:ext>
+            </a:extLst>
+          </p:cNvPr>
+          <p:cNvPicPr>
+            <a:picLocks noChangeAspect="1"/>
+          </p:cNvPicPr>
+          <p:nvPr/>
+        </p:nvPicPr>
+        <p:blipFill>
+          <a:blip r:embed="rId4"/>
+          <a:stretch>
+            <a:fillRect/>
+          </a:stretch>
+        </p:blipFill>
+        <p:spPr>
+          <a:xfrm>
+            <a:off x="6372505" y="3238624"/>
+            <a:ext cx="4010585" cy="1781424"/>
+          </a:xfrm>
+          <a:prstGeom prst="rect">
+            <a:avLst/>
+          </a:prstGeom>
+        </p:spPr>
+      </p:pic>
+      <p:sp>
+        <p:nvSpPr>
+          <p:cNvPr id="9" name="Rectangle 8">
+            <a:extLst>
+              <a:ext uri="{FF2B5EF4-FFF2-40B4-BE49-F238E27FC236}">
+                <a16:creationId xmlns:a16="http://schemas.microsoft.com/office/drawing/2014/main" id="{6A1A6908-59A5-97FE-BB90-D574B983A9ED}"/>
+              </a:ext>
+            </a:extLst>
+          </p:cNvPr>
+          <p:cNvSpPr/>
+          <p:nvPr/>
+        </p:nvSpPr>
+        <p:spPr>
+          <a:xfrm>
+            <a:off x="6656832" y="2697480"/>
+            <a:ext cx="3483864" cy="541130"/>
+          </a:xfrm>
+          <a:prstGeom prst="rect">
+            <a:avLst/>
+          </a:prstGeom>
+          <a:solidFill>
+            <a:schemeClr val="bg1"/>
+          </a:solidFill>
+          <a:ln>
+            <a:solidFill>
+              <a:schemeClr val="bg1"/>
+            </a:solidFill>
+          </a:ln>
+        </p:spPr>
+        <p:style>
+          <a:lnRef idx="2">
+            <a:schemeClr val="accent1">
+              <a:shade val="15000"/>
+            </a:schemeClr>
+          </a:lnRef>
+          <a:fillRef idx="1">
+            <a:schemeClr val="accent1"/>
+          </a:fillRef>
+          <a:effectRef idx="0">
+            <a:schemeClr val="accent1"/>
+          </a:effectRef>
+          <a:fontRef idx="minor">
+            <a:schemeClr val="lt1"/>
+          </a:fontRef>
+        </p:style>
+        <p:txBody>
+          <a:bodyPr rtlCol="0" anchor="ctr"/>
+          <a:lstStyle/>
+          <a:p>
+            <a:pPr algn="ctr"/>
+            <a:r>
+              <a:rPr lang="en-US" dirty="0">
+                <a:solidFill>
+                  <a:schemeClr val="tx1"/>
+                </a:solidFill>
+              </a:rPr>
+              <a:t>Obesity within salary groups</a:t>
+            </a:r>
+          </a:p>
+        </p:txBody>
+      </p:sp>
+    </p:spTree>
+    <p:extLst>
+      <p:ext uri="{BB962C8B-B14F-4D97-AF65-F5344CB8AC3E}">
+        <p14:creationId xmlns:p14="http://schemas.microsoft.com/office/powerpoint/2010/main" val="2183036255"/>
+      </p:ext>
+    </p:extLst>
+  </p:cSld>
+  <p:clrMapOvr>
+    <a:masterClrMapping/>
+  </p:clrMapOvr>
+</p:sld>
+</file>
+
+<file path=ppt/slides/slide13.xml><?xml version="1.0" encoding="utf-8"?>
+<p:sld xmlns:a="http://schemas.openxmlformats.org/drawingml/2006/main" xmlns:r="http://schemas.openxmlformats.org/officeDocument/2006/relationships" xmlns:p="http://schemas.openxmlformats.org/presentationml/2006/main">
+  <p:cSld>
+    <p:bg>
+      <p:bgPr>
+        <a:solidFill>
+          <a:schemeClr val="bg1"/>
+        </a:solidFill>
+        <a:effectLst/>
+      </p:bgPr>
+    </p:bg>
+    <p:spTree>
+      <p:nvGrpSpPr>
+        <p:cNvPr id="1" name="">
+          <a:extLst>
+            <a:ext uri="{FF2B5EF4-FFF2-40B4-BE49-F238E27FC236}">
+              <a16:creationId xmlns:a16="http://schemas.microsoft.com/office/drawing/2014/main" id="{4D20DD1A-1868-85B7-D088-936C5F926E6C}"/>
+            </a:ext>
+          </a:extLst>
+        </p:cNvPr>
+        <p:cNvGrpSpPr/>
+        <p:nvPr/>
+      </p:nvGrpSpPr>
+      <p:grpSpPr>
+        <a:xfrm>
+          <a:off x="0" y="0"/>
+          <a:ext cx="0" cy="0"/>
+          <a:chOff x="0" y="0"/>
+          <a:chExt cx="0" cy="0"/>
+        </a:xfrm>
+      </p:grpSpPr>
+      <p:sp useBgFill="1">
+        <p:nvSpPr>
+          <p:cNvPr id="60" name="Rectangle 59">
+            <a:extLst>
+              <a:ext uri="{FF2B5EF4-FFF2-40B4-BE49-F238E27FC236}">
+                <a16:creationId xmlns:a16="http://schemas.microsoft.com/office/drawing/2014/main" id="{7B8FBEB2-0054-DA25-A330-A0A3A79BD8D1}"/>
+              </a:ext>
+              <a:ext uri="{C183D7F6-B498-43B3-948B-1728B52AA6E4}">
+                <adec:decorative xmlns:adec="http://schemas.microsoft.com/office/drawing/2017/decorative" val="1"/>
+              </a:ext>
+            </a:extLst>
+          </p:cNvPr>
+          <p:cNvSpPr>
+            <a:spLocks noGrp="1" noRot="1" noChangeAspect="1" noMove="1" noResize="1" noEditPoints="1" noAdjustHandles="1" noChangeArrowheads="1" noChangeShapeType="1" noTextEdit="1"/>
+          </p:cNvSpPr>
+          <p:nvPr>
+            <p:extLst>
+              <p:ext uri="{386F3935-93C4-4BCD-93E2-E3B085C9AB24}">
+                <p16:designElem xmlns:p16="http://schemas.microsoft.com/office/powerpoint/2015/main" val="1"/>
+              </p:ext>
+            </p:extLst>
+          </p:nvPr>
+        </p:nvSpPr>
+        <p:spPr>
+          <a:xfrm>
+            <a:off x="0" y="0"/>
+            <a:ext cx="12192000" cy="6858000"/>
+          </a:xfrm>
+          <a:prstGeom prst="rect">
+            <a:avLst/>
+          </a:prstGeom>
+          <a:ln w="12700" cap="flat" cmpd="sng" algn="ctr">
+            <a:noFill/>
+            <a:prstDash val="solid"/>
+            <a:miter lim="800000"/>
+          </a:ln>
+          <a:effectLst/>
+          <a:extLst>
+            <a:ext uri="{91240B29-F687-4F45-9708-019B960494DF}">
+              <a14:hiddenLine xmlns:a14="http://schemas.microsoft.com/office/drawing/2010/main" w="12700" cap="flat" cmpd="sng" algn="ctr">
+                <a:solidFill>
+                  <a:schemeClr val="accent1">
+                    <a:shade val="50000"/>
+                  </a:schemeClr>
+                </a:solidFill>
+                <a:prstDash val="solid"/>
+                <a:miter lim="800000"/>
+              </a14:hiddenLine>
+            </a:ext>
+          </a:extLst>
+        </p:spPr>
+        <p:style>
+          <a:lnRef idx="2">
+            <a:schemeClr val="accent1">
+              <a:shade val="50000"/>
+            </a:schemeClr>
+          </a:lnRef>
+          <a:fillRef idx="1">
+            <a:schemeClr val="accent1"/>
+          </a:fillRef>
+          <a:effectRef idx="0">
+            <a:schemeClr val="accent1"/>
+          </a:effectRef>
+          <a:fontRef idx="minor">
+            <a:schemeClr val="lt1"/>
+          </a:fontRef>
+        </p:style>
+        <p:txBody>
+          <a:bodyPr rtlCol="0" anchor="ctr"/>
+          <a:lstStyle/>
+          <a:p>
+            <a:pPr algn="ctr"/>
+            <a:endParaRPr lang="en-US"/>
+          </a:p>
+        </p:txBody>
+      </p:sp>
+      <p:pic>
+        <p:nvPicPr>
+          <p:cNvPr id="53" name="Picture 52" descr="Vector background of vibrant colors splashing">
+            <a:extLst>
+              <a:ext uri="{FF2B5EF4-FFF2-40B4-BE49-F238E27FC236}">
+                <a16:creationId xmlns:a16="http://schemas.microsoft.com/office/drawing/2014/main" id="{BB2D6F8A-7758-85B7-DFCB-FC8D9A69DC83}"/>
+              </a:ext>
+            </a:extLst>
+          </p:cNvPr>
+          <p:cNvPicPr>
+            <a:picLocks noChangeAspect="1"/>
+          </p:cNvPicPr>
+          <p:nvPr/>
+        </p:nvPicPr>
+        <p:blipFill>
+          <a:blip r:embed="rId2"/>
+          <a:srcRect t="17279"/>
+          <a:stretch/>
+        </p:blipFill>
+        <p:spPr>
+          <a:xfrm>
+            <a:off x="-3" y="-3"/>
+            <a:ext cx="12191979" cy="6857989"/>
+          </a:xfrm>
+          <a:prstGeom prst="rect">
+            <a:avLst/>
+          </a:prstGeom>
+        </p:spPr>
+      </p:pic>
+      <p:sp>
+        <p:nvSpPr>
+          <p:cNvPr id="62" name="Rectangle 61">
+            <a:extLst>
+              <a:ext uri="{FF2B5EF4-FFF2-40B4-BE49-F238E27FC236}">
+                <a16:creationId xmlns:a16="http://schemas.microsoft.com/office/drawing/2014/main" id="{B02DFC4A-E42C-8EBD-025A-BE1B94B4099C}"/>
+              </a:ext>
+              <a:ext uri="{C183D7F6-B498-43B3-948B-1728B52AA6E4}">
+                <adec:decorative xmlns:adec="http://schemas.microsoft.com/office/drawing/2017/decorative" val="1"/>
+              </a:ext>
+            </a:extLst>
+          </p:cNvPr>
+          <p:cNvSpPr>
+            <a:spLocks noGrp="1" noRot="1" noChangeAspect="1" noMove="1" noResize="1" noEditPoints="1" noAdjustHandles="1" noChangeArrowheads="1" noChangeShapeType="1" noTextEdit="1"/>
+          </p:cNvSpPr>
+          <p:nvPr>
+            <p:extLst>
+              <p:ext uri="{386F3935-93C4-4BCD-93E2-E3B085C9AB24}">
+                <p16:designElem xmlns:p16="http://schemas.microsoft.com/office/powerpoint/2015/main" val="1"/>
+              </p:ext>
+            </p:extLst>
+          </p:nvPr>
+        </p:nvSpPr>
+        <p:spPr>
+          <a:xfrm rot="5400000">
+            <a:off x="960265" y="-960268"/>
+            <a:ext cx="6857998" cy="8778533"/>
+          </a:xfrm>
+          <a:prstGeom prst="rect">
+            <a:avLst/>
+          </a:prstGeom>
+          <a:gradFill>
+            <a:gsLst>
+              <a:gs pos="0">
+                <a:srgbClr val="000000">
+                  <a:alpha val="0"/>
+                </a:srgbClr>
+              </a:gs>
+              <a:gs pos="67900">
+                <a:srgbClr val="000000">
+                  <a:alpha val="33000"/>
+                </a:srgbClr>
+              </a:gs>
+              <a:gs pos="100000">
+                <a:srgbClr val="000000">
+                  <a:alpha val="52000"/>
+                </a:srgbClr>
+              </a:gs>
+            </a:gsLst>
+            <a:lin ang="5400000" scaled="1"/>
+          </a:gradFill>
+          <a:ln>
+            <a:noFill/>
+          </a:ln>
+        </p:spPr>
+        <p:style>
+          <a:lnRef idx="2">
+            <a:schemeClr val="accent1">
+              <a:shade val="50000"/>
+            </a:schemeClr>
+          </a:lnRef>
+          <a:fillRef idx="1">
+            <a:schemeClr val="accent1"/>
+          </a:fillRef>
+          <a:effectRef idx="0">
+            <a:schemeClr val="accent1"/>
+          </a:effectRef>
+          <a:fontRef idx="minor">
+            <a:schemeClr val="lt1"/>
+          </a:fontRef>
+        </p:style>
+        <p:txBody>
+          <a:bodyPr rtlCol="0" anchor="ctr"/>
+          <a:lstStyle/>
+          <a:p>
+            <a:pPr algn="ctr"/>
+            <a:endParaRPr lang="en-US"/>
+          </a:p>
+        </p:txBody>
+      </p:sp>
+      <p:sp>
+        <p:nvSpPr>
+          <p:cNvPr id="2" name="Title 1">
+            <a:extLst>
+              <a:ext uri="{FF2B5EF4-FFF2-40B4-BE49-F238E27FC236}">
+                <a16:creationId xmlns:a16="http://schemas.microsoft.com/office/drawing/2014/main" id="{E57529F5-C354-CF18-9381-EE544ACC1317}"/>
+              </a:ext>
+            </a:extLst>
+          </p:cNvPr>
+          <p:cNvSpPr>
+            <a:spLocks noGrp="1"/>
+          </p:cNvSpPr>
+          <p:nvPr>
+            <p:ph type="ctrTitle"/>
+          </p:nvPr>
+        </p:nvSpPr>
+        <p:spPr>
+          <a:xfrm>
+            <a:off x="1066802" y="-762072"/>
+            <a:ext cx="5029198" cy="2305246"/>
+          </a:xfrm>
+        </p:spPr>
+        <p:txBody>
+          <a:bodyPr>
+            <a:normAutofit/>
+          </a:bodyPr>
+          <a:lstStyle/>
+          <a:p>
+            <a:r>
+              <a:rPr lang="en-US" sz="4400" dirty="0">
+                <a:solidFill>
+                  <a:srgbClr val="FFFFFF"/>
+                </a:solidFill>
+              </a:rPr>
+              <a:t>Conclusion</a:t>
+            </a:r>
+          </a:p>
+        </p:txBody>
+      </p:sp>
+      <p:sp>
+        <p:nvSpPr>
+          <p:cNvPr id="4" name="Rectangle 3">
+            <a:extLst>
+              <a:ext uri="{FF2B5EF4-FFF2-40B4-BE49-F238E27FC236}">
+                <a16:creationId xmlns:a16="http://schemas.microsoft.com/office/drawing/2014/main" id="{0FEB77C7-ECE0-581A-B722-868E95B9B105}"/>
+              </a:ext>
+            </a:extLst>
+          </p:cNvPr>
+          <p:cNvSpPr/>
+          <p:nvPr/>
+        </p:nvSpPr>
+        <p:spPr>
+          <a:xfrm>
+            <a:off x="704850" y="1695450"/>
+            <a:ext cx="10563225" cy="4743450"/>
+          </a:xfrm>
+          <a:prstGeom prst="rect">
+            <a:avLst/>
+          </a:prstGeom>
+          <a:solidFill>
+            <a:schemeClr val="bg1"/>
+          </a:solidFill>
+          <a:ln>
+            <a:solidFill>
+              <a:schemeClr val="bg1"/>
+            </a:solidFill>
+          </a:ln>
+        </p:spPr>
+        <p:style>
+          <a:lnRef idx="2">
+            <a:schemeClr val="accent1">
+              <a:shade val="15000"/>
+            </a:schemeClr>
+          </a:lnRef>
+          <a:fillRef idx="1">
+            <a:schemeClr val="accent1"/>
+          </a:fillRef>
+          <a:effectRef idx="0">
+            <a:schemeClr val="accent1"/>
+          </a:effectRef>
+          <a:fontRef idx="minor">
+            <a:schemeClr val="lt1"/>
+          </a:fontRef>
+        </p:style>
+        <p:txBody>
+          <a:bodyPr rtlCol="0" anchor="ctr"/>
+          <a:lstStyle/>
+          <a:p>
+            <a:pPr algn="ctr"/>
+            <a:endParaRPr lang="en-US" dirty="0">
+              <a:ln>
+                <a:solidFill>
+                  <a:schemeClr val="bg1"/>
+                </a:solidFill>
+              </a:ln>
+              <a:solidFill>
+                <a:schemeClr val="bg1"/>
+              </a:solidFill>
+            </a:endParaRPr>
+          </a:p>
+        </p:txBody>
+      </p:sp>
+      <p:sp>
+        <p:nvSpPr>
+          <p:cNvPr id="3" name="Subtitle 2">
+            <a:extLst>
+              <a:ext uri="{FF2B5EF4-FFF2-40B4-BE49-F238E27FC236}">
+                <a16:creationId xmlns:a16="http://schemas.microsoft.com/office/drawing/2014/main" id="{41270F74-9157-D6D0-A622-9AAA111F4429}"/>
+              </a:ext>
+            </a:extLst>
+          </p:cNvPr>
+          <p:cNvSpPr>
+            <a:spLocks noGrp="1"/>
+          </p:cNvSpPr>
+          <p:nvPr>
+            <p:ph type="subTitle" idx="1"/>
+          </p:nvPr>
+        </p:nvSpPr>
+        <p:spPr>
+          <a:xfrm>
+            <a:off x="1066802" y="1977542"/>
+            <a:ext cx="9814558" cy="4203801"/>
+          </a:xfrm>
+        </p:spPr>
+        <p:txBody>
+          <a:bodyPr>
+            <a:normAutofit/>
+          </a:bodyPr>
+          <a:lstStyle/>
+          <a:p>
+            <a:r>
+              <a:rPr lang="en-US" sz="1600" dirty="0"/>
+              <a:t>We can see that the main</a:t>
+            </a:r>
+          </a:p>
+        </p:txBody>
+      </p:sp>
+    </p:spTree>
+    <p:extLst>
+      <p:ext uri="{BB962C8B-B14F-4D97-AF65-F5344CB8AC3E}">
+        <p14:creationId xmlns:p14="http://schemas.microsoft.com/office/powerpoint/2010/main" val="1116715139"/>
+      </p:ext>
+    </p:extLst>
+  </p:cSld>
+  <p:clrMapOvr>
+    <a:masterClrMapping/>
+  </p:clrMapOvr>
+</p:sld>
+</file>
+
 <file path=ppt/slides/slide2.xml><?xml version="1.0" encoding="utf-8"?>
 <p:sld xmlns:a="http://schemas.openxmlformats.org/drawingml/2006/main" xmlns:r="http://schemas.openxmlformats.org/officeDocument/2006/relationships" xmlns:p="http://schemas.openxmlformats.org/presentationml/2006/main">
   <p:cSld>
@@ -6032,7 +7808,50 @@
           <a:p>
             <a:r>
               <a:rPr lang="en-US" dirty="0"/>
-              <a:t>A</a:t>
+              <a:t>The steps we took to process the data were:</a:t>
+            </a:r>
+          </a:p>
+          <a:p>
+            <a:pPr marL="457200" indent="-457200">
+              <a:buAutoNum type="arabicPeriod"/>
+            </a:pPr>
+            <a:r>
+              <a:rPr lang="en-US" dirty="0"/>
+              <a:t>Select only the rows that were related to our project. </a:t>
+            </a:r>
+          </a:p>
+          <a:p>
+            <a:r>
+              <a:rPr lang="en-US" dirty="0"/>
+              <a:t>	This meant picking out redundancies, and most ID columns</a:t>
+            </a:r>
+          </a:p>
+          <a:p>
+            <a:r>
+              <a:rPr lang="en-US" dirty="0"/>
+              <a:t>2.    Build a </a:t>
+            </a:r>
+            <a:r>
+              <a:rPr lang="en-US" dirty="0" err="1"/>
+              <a:t>dataframe</a:t>
+            </a:r>
+            <a:r>
+              <a:rPr lang="en-US" dirty="0"/>
+              <a:t> that we could build and filter against to answer some of our questions.</a:t>
+            </a:r>
+          </a:p>
+          <a:p>
+            <a:r>
+              <a:rPr lang="en-US" dirty="0"/>
+              <a:t>3.    Create additional </a:t>
+            </a:r>
+            <a:r>
+              <a:rPr lang="en-US" dirty="0" err="1"/>
+              <a:t>dataframes</a:t>
+            </a:r>
+            <a:r>
+              <a:rPr lang="en-US" dirty="0"/>
+              <a:t> that pertain to each individual question in the dataset so we can use this data’s questions to answer our own.</a:t>
             </a:r>
           </a:p>
         </p:txBody>
@@ -6397,8 +8216,44 @@
           <a:lstStyle/>
           <a:p>
             <a:r>
-              <a:rPr lang="en-US" sz="1600" dirty="0"/>
-              <a:t>Slide #</a:t>
+              <a:rPr lang="en-US" dirty="0"/>
+              <a:t>The questions we wanted to ask about this data set are:</a:t>
+            </a:r>
+          </a:p>
+          <a:p>
+            <a:pPr marL="457200" indent="-457200">
+              <a:buAutoNum type="arabicPeriod"/>
+            </a:pPr>
+            <a:r>
+              <a:rPr lang="en-US" dirty="0"/>
+              <a:t>How do nutrition, physical activity, and obesity metrics vary across different states?</a:t>
+            </a:r>
+          </a:p>
+          <a:p>
+            <a:pPr marL="457200" indent="-457200">
+              <a:buAutoNum type="arabicPeriod"/>
+            </a:pPr>
+            <a:r>
+              <a:rPr lang="en-US" dirty="0"/>
+              <a:t>What demographic factors (age, gender, income, education, race/ethnicity) are most associated with variations in health metrics?</a:t>
+            </a:r>
+          </a:p>
+          <a:p>
+            <a:pPr marL="457200" indent="-457200">
+              <a:buAutoNum type="arabicPeriod"/>
+            </a:pPr>
+            <a:r>
+              <a:rPr lang="en-US" dirty="0"/>
+              <a:t>Have there been significant changes over time in key metrics like obesity?</a:t>
+            </a:r>
+          </a:p>
+          <a:p>
+            <a:pPr marL="457200" indent="-457200">
+              <a:buAutoNum type="arabicPeriod"/>
+            </a:pPr>
+            <a:r>
+              <a:rPr lang="en-US" dirty="0"/>
+              <a:t>What is the relationship between socioeconomic status (e.g., income, education) and health measures like obesity and physical activity?</a:t>
             </a:r>
           </a:p>
         </p:txBody>
@@ -6651,7 +8506,7 @@
         <p:spPr>
           <a:xfrm>
             <a:off x="1066802" y="-762072"/>
-            <a:ext cx="5029198" cy="2305246"/>
+            <a:ext cx="5553454" cy="2305246"/>
           </a:xfrm>
         </p:spPr>
         <p:txBody>
@@ -6666,7 +8521,7 @@
                   <a:srgbClr val="FFFFFF"/>
                 </a:solidFill>
               </a:rPr>
-              <a:t>Our Procedure</a:t>
+              <a:t>Our Procedure pt. 1</a:t>
             </a:r>
           </a:p>
         </p:txBody>
@@ -6758,14 +8613,32 @@
         </p:spPr>
         <p:txBody>
           <a:bodyPr>
-            <a:normAutofit/>
+            <a:normAutofit lnSpcReduction="10000"/>
           </a:bodyPr>
           <a:lstStyle/>
           <a:p>
             <a:r>
-              <a:rPr lang="en-US" sz="1600" dirty="0"/>
-              <a:t>Slide #</a:t>
-            </a:r>
+              <a:rPr lang="en-US" dirty="0"/>
+              <a:t>Each question we asked had a slightly different approach, but for all of them, we know we were going to refer to the `Question` column for all of them. This column contained 1 of 9 health questions that our data was built sparsely on. We classified 2 of these questions as “health outcomes” and the other 7 as “health behaviors”</a:t>
+            </a:r>
+          </a:p>
+          <a:p>
+            <a:r>
+              <a:rPr lang="en-US" dirty="0"/>
+              <a:t>A sparse example of an “outcome” question is: “Percent of adults aged 18 years and older who have obesity” where data was collected among just males making $15,000 to $29,999 a year.</a:t>
+            </a:r>
+          </a:p>
+          <a:p>
+            <a:r>
+              <a:rPr lang="en-US" dirty="0"/>
+              <a:t>A sparse example of a “behavior” question is: “Percent of adults who participate in strength training twice a week” where data was collected among just males making $15,000 to $29,999 a year.</a:t>
+            </a:r>
+          </a:p>
+          <a:p>
+            <a:endParaRPr lang="en-US" dirty="0"/>
+          </a:p>
+          <a:p>
+            <a:endParaRPr lang="en-US" dirty="0"/>
           </a:p>
         </p:txBody>
       </p:sp>
@@ -6798,7 +8671,7 @@
         <p:cNvPr id="1" name="">
           <a:extLst>
             <a:ext uri="{FF2B5EF4-FFF2-40B4-BE49-F238E27FC236}">
-              <a16:creationId xmlns:a16="http://schemas.microsoft.com/office/drawing/2014/main" id="{AE4DD90E-8F9A-BA1A-CB37-3E9FBB1EBE54}"/>
+              <a16:creationId xmlns:a16="http://schemas.microsoft.com/office/drawing/2014/main" id="{AFFA563E-3FFD-C204-611A-7B7B3EB786A2}"/>
             </a:ext>
           </a:extLst>
         </p:cNvPr>
@@ -6818,7 +8691,7 @@
           <p:cNvPr id="60" name="Rectangle 59">
             <a:extLst>
               <a:ext uri="{FF2B5EF4-FFF2-40B4-BE49-F238E27FC236}">
-                <a16:creationId xmlns:a16="http://schemas.microsoft.com/office/drawing/2014/main" id="{AD15DE5C-C119-D6DB-A4AF-5A67BEDDCADC}"/>
+                <a16:creationId xmlns:a16="http://schemas.microsoft.com/office/drawing/2014/main" id="{7DD5092B-3040-2CB8-2188-9152428EA16E}"/>
               </a:ext>
               <a:ext uri="{C183D7F6-B498-43B3-948B-1728B52AA6E4}">
                 <adec:decorative xmlns:adec="http://schemas.microsoft.com/office/drawing/2017/decorative" val="1"/>
@@ -6894,7 +8767,7 @@
           <p:cNvPr id="53" name="Picture 52" descr="Vector background of vibrant colors splashing">
             <a:extLst>
               <a:ext uri="{FF2B5EF4-FFF2-40B4-BE49-F238E27FC236}">
-                <a16:creationId xmlns:a16="http://schemas.microsoft.com/office/drawing/2014/main" id="{BFDCF18C-B2EC-43F1-C17F-43E8E3277E5B}"/>
+                <a16:creationId xmlns:a16="http://schemas.microsoft.com/office/drawing/2014/main" id="{7601A4A9-EC20-7513-8DA0-A11AC89B0F5B}"/>
               </a:ext>
             </a:extLst>
           </p:cNvPr>
@@ -6923,7 +8796,7 @@
           <p:cNvPr id="62" name="Rectangle 61">
             <a:extLst>
               <a:ext uri="{FF2B5EF4-FFF2-40B4-BE49-F238E27FC236}">
-                <a16:creationId xmlns:a16="http://schemas.microsoft.com/office/drawing/2014/main" id="{A5E29CD6-A742-E867-9D86-C2D1C2FD5E78}"/>
+                <a16:creationId xmlns:a16="http://schemas.microsoft.com/office/drawing/2014/main" id="{2B08FC80-FC8C-5880-1694-918C1F47106E}"/>
               </a:ext>
               <a:ext uri="{C183D7F6-B498-43B3-948B-1728B52AA6E4}">
                 <adec:decorative xmlns:adec="http://schemas.microsoft.com/office/drawing/2017/decorative" val="1"/>
@@ -7003,7 +8876,7 @@
           <p:cNvPr id="2" name="Title 1">
             <a:extLst>
               <a:ext uri="{FF2B5EF4-FFF2-40B4-BE49-F238E27FC236}">
-                <a16:creationId xmlns:a16="http://schemas.microsoft.com/office/drawing/2014/main" id="{4EB19D62-4BA1-E771-8DBA-BE9A6E493F06}"/>
+                <a16:creationId xmlns:a16="http://schemas.microsoft.com/office/drawing/2014/main" id="{49088F36-D10A-D7D2-E8D0-338A17CE8FD8}"/>
               </a:ext>
             </a:extLst>
           </p:cNvPr>
@@ -7017,7 +8890,7 @@
         <p:spPr>
           <a:xfrm>
             <a:off x="1066802" y="-762072"/>
-            <a:ext cx="5029198" cy="2305246"/>
+            <a:ext cx="5590030" cy="2305246"/>
           </a:xfrm>
         </p:spPr>
         <p:txBody>
@@ -7032,7 +8905,7 @@
                   <a:srgbClr val="FFFFFF"/>
                 </a:solidFill>
               </a:rPr>
-              <a:t>Results</a:t>
+              <a:t>Our Procedure pt. 2</a:t>
             </a:r>
           </a:p>
         </p:txBody>
@@ -7042,7 +8915,7 @@
           <p:cNvPr id="4" name="Rectangle 3">
             <a:extLst>
               <a:ext uri="{FF2B5EF4-FFF2-40B4-BE49-F238E27FC236}">
-                <a16:creationId xmlns:a16="http://schemas.microsoft.com/office/drawing/2014/main" id="{1E4D9185-1BC7-85A1-77CA-E6244EF02C38}"/>
+                <a16:creationId xmlns:a16="http://schemas.microsoft.com/office/drawing/2014/main" id="{F6E0C372-EE42-700E-F4D7-58656D67F67B}"/>
               </a:ext>
             </a:extLst>
           </p:cNvPr>
@@ -7105,7 +8978,7 @@
           <p:cNvPr id="3" name="Subtitle 2">
             <a:extLst>
               <a:ext uri="{FF2B5EF4-FFF2-40B4-BE49-F238E27FC236}">
-                <a16:creationId xmlns:a16="http://schemas.microsoft.com/office/drawing/2014/main" id="{7CB15891-0A66-0B6E-F16A-097239BB08BC}"/>
+                <a16:creationId xmlns:a16="http://schemas.microsoft.com/office/drawing/2014/main" id="{48C797CB-B98A-DE07-5174-1BC09A212C33}"/>
               </a:ext>
             </a:extLst>
           </p:cNvPr>
@@ -7118,27 +8991,82 @@
         </p:nvSpPr>
         <p:spPr>
           <a:xfrm>
-            <a:off x="1066802" y="1977542"/>
+            <a:off x="1066802" y="1776374"/>
             <a:ext cx="9814558" cy="4203801"/>
           </a:xfrm>
         </p:spPr>
         <p:txBody>
           <a:bodyPr>
-            <a:normAutofit/>
+            <a:normAutofit fontScale="85000" lnSpcReduction="20000"/>
           </a:bodyPr>
           <a:lstStyle/>
           <a:p>
             <a:r>
-              <a:rPr lang="en-US" sz="1600" dirty="0"/>
-              <a:t>Slide #</a:t>
-            </a:r>
+              <a:rPr lang="en-US" dirty="0"/>
+              <a:t>For each of our group’s questions, we then related in some way.</a:t>
+            </a:r>
+          </a:p>
+          <a:p>
+            <a:r>
+              <a:rPr lang="en-US" sz="1400" dirty="0"/>
+              <a:t>Question 1: How do nutrition, physical activity, and obesity metrics vary across different states?</a:t>
+            </a:r>
+          </a:p>
+          <a:p>
+            <a:r>
+              <a:rPr lang="en-US" dirty="0"/>
+              <a:t>We analyzed the data per state and visualized it based on “healthy” or “unhealthy” practices / outcomes</a:t>
+            </a:r>
+          </a:p>
+          <a:p>
+            <a:r>
+              <a:rPr lang="en-US" sz="1400" dirty="0"/>
+              <a:t>Question 2: What demographic factors (age, gender, income, education, race/ethnicity) are most associated with variations in health metrics?</a:t>
+            </a:r>
+          </a:p>
+          <a:p>
+            <a:r>
+              <a:rPr lang="en-US" dirty="0"/>
+              <a:t>We normalized the sample size then averaged the result data value. This allowed us to compare equally all the different questions and split them out.</a:t>
+            </a:r>
+          </a:p>
+          <a:p>
+            <a:r>
+              <a:rPr lang="en-US" sz="1400" dirty="0"/>
+              <a:t>Question 3: Have there been significant changes over time in key metrics like obesity?</a:t>
+            </a:r>
+          </a:p>
+          <a:p>
+            <a:r>
+              <a:rPr lang="en-US" dirty="0"/>
+              <a:t>We looked at the overall sample’s results for health metrics and plotted them to see patterns.</a:t>
+            </a:r>
+          </a:p>
+          <a:p>
+            <a:r>
+              <a:rPr lang="en-US" sz="1400" dirty="0"/>
+              <a:t>Question 4: What is the relationship between socioeconomic status (e.g., income, education) and health measures like obesity and physical activity?</a:t>
+            </a:r>
+          </a:p>
+          <a:p>
+            <a:r>
+              <a:rPr lang="en-US" dirty="0"/>
+              <a:t>We took Income ranges and created an ANOVA with box and whisker plots to draw conclusions.</a:t>
+            </a:r>
+            <a:endParaRPr lang="en-US" sz="2200" dirty="0"/>
+          </a:p>
+          <a:p>
+            <a:endParaRPr lang="en-US" sz="2200" dirty="0"/>
+          </a:p>
+          <a:p>
+            <a:endParaRPr lang="en-US" dirty="0"/>
           </a:p>
         </p:txBody>
       </p:sp>
     </p:spTree>
     <p:extLst>
       <p:ext uri="{BB962C8B-B14F-4D97-AF65-F5344CB8AC3E}">
-        <p14:creationId xmlns:p14="http://schemas.microsoft.com/office/powerpoint/2010/main" val="1706235225"/>
+        <p14:creationId xmlns:p14="http://schemas.microsoft.com/office/powerpoint/2010/main" val="3942416285"/>
       </p:ext>
     </p:extLst>
   </p:cSld>
@@ -7164,7 +9092,7 @@
         <p:cNvPr id="1" name="">
           <a:extLst>
             <a:ext uri="{FF2B5EF4-FFF2-40B4-BE49-F238E27FC236}">
-              <a16:creationId xmlns:a16="http://schemas.microsoft.com/office/drawing/2014/main" id="{4D20DD1A-1868-85B7-D088-936C5F926E6C}"/>
+              <a16:creationId xmlns:a16="http://schemas.microsoft.com/office/drawing/2014/main" id="{0EFA8E9A-82A9-D785-9D99-89B978F8BEEC}"/>
             </a:ext>
           </a:extLst>
         </p:cNvPr>
@@ -7184,7 +9112,7 @@
           <p:cNvPr id="60" name="Rectangle 59">
             <a:extLst>
               <a:ext uri="{FF2B5EF4-FFF2-40B4-BE49-F238E27FC236}">
-                <a16:creationId xmlns:a16="http://schemas.microsoft.com/office/drawing/2014/main" id="{7B8FBEB2-0054-DA25-A330-A0A3A79BD8D1}"/>
+                <a16:creationId xmlns:a16="http://schemas.microsoft.com/office/drawing/2014/main" id="{414DDCA1-5CB7-12D7-A09F-9C238E7F0B73}"/>
               </a:ext>
               <a:ext uri="{C183D7F6-B498-43B3-948B-1728B52AA6E4}">
                 <adec:decorative xmlns:adec="http://schemas.microsoft.com/office/drawing/2017/decorative" val="1"/>
@@ -7260,7 +9188,7 @@
           <p:cNvPr id="53" name="Picture 52" descr="Vector background of vibrant colors splashing">
             <a:extLst>
               <a:ext uri="{FF2B5EF4-FFF2-40B4-BE49-F238E27FC236}">
-                <a16:creationId xmlns:a16="http://schemas.microsoft.com/office/drawing/2014/main" id="{BB2D6F8A-7758-85B7-DFCB-FC8D9A69DC83}"/>
+                <a16:creationId xmlns:a16="http://schemas.microsoft.com/office/drawing/2014/main" id="{3ADC70E6-FB36-E64C-89E6-7A093E1FAB89}"/>
               </a:ext>
             </a:extLst>
           </p:cNvPr>
@@ -7289,7 +9217,7 @@
           <p:cNvPr id="62" name="Rectangle 61">
             <a:extLst>
               <a:ext uri="{FF2B5EF4-FFF2-40B4-BE49-F238E27FC236}">
-                <a16:creationId xmlns:a16="http://schemas.microsoft.com/office/drawing/2014/main" id="{B02DFC4A-E42C-8EBD-025A-BE1B94B4099C}"/>
+                <a16:creationId xmlns:a16="http://schemas.microsoft.com/office/drawing/2014/main" id="{6D1F57D4-80A3-E942-6E08-CE282C17BFD2}"/>
               </a:ext>
               <a:ext uri="{C183D7F6-B498-43B3-948B-1728B52AA6E4}">
                 <adec:decorative xmlns:adec="http://schemas.microsoft.com/office/drawing/2017/decorative" val="1"/>
@@ -7369,7 +9297,7 @@
           <p:cNvPr id="2" name="Title 1">
             <a:extLst>
               <a:ext uri="{FF2B5EF4-FFF2-40B4-BE49-F238E27FC236}">
-                <a16:creationId xmlns:a16="http://schemas.microsoft.com/office/drawing/2014/main" id="{E57529F5-C354-CF18-9381-EE544ACC1317}"/>
+                <a16:creationId xmlns:a16="http://schemas.microsoft.com/office/drawing/2014/main" id="{4C429EEF-E55D-280F-0F25-866BDFCB3D24}"/>
               </a:ext>
             </a:extLst>
           </p:cNvPr>
@@ -7383,7 +9311,7 @@
         <p:spPr>
           <a:xfrm>
             <a:off x="1066802" y="-762072"/>
-            <a:ext cx="5029198" cy="2305246"/>
+            <a:ext cx="5590030" cy="2305246"/>
           </a:xfrm>
         </p:spPr>
         <p:txBody>
@@ -7398,7 +9326,7 @@
                   <a:srgbClr val="FFFFFF"/>
                 </a:solidFill>
               </a:rPr>
-              <a:t>Conclusion</a:t>
+              <a:t>Results</a:t>
             </a:r>
           </a:p>
         </p:txBody>
@@ -7408,7 +9336,7 @@
           <p:cNvPr id="4" name="Rectangle 3">
             <a:extLst>
               <a:ext uri="{FF2B5EF4-FFF2-40B4-BE49-F238E27FC236}">
-                <a16:creationId xmlns:a16="http://schemas.microsoft.com/office/drawing/2014/main" id="{0FEB77C7-ECE0-581A-B722-868E95B9B105}"/>
+                <a16:creationId xmlns:a16="http://schemas.microsoft.com/office/drawing/2014/main" id="{5CB03004-4A10-FF99-D09D-EF54FE7203E7}"/>
               </a:ext>
             </a:extLst>
           </p:cNvPr>
@@ -7471,7 +9399,7 @@
           <p:cNvPr id="3" name="Subtitle 2">
             <a:extLst>
               <a:ext uri="{FF2B5EF4-FFF2-40B4-BE49-F238E27FC236}">
-                <a16:creationId xmlns:a16="http://schemas.microsoft.com/office/drawing/2014/main" id="{41270F74-9157-D6D0-A622-9AAA111F4429}"/>
+                <a16:creationId xmlns:a16="http://schemas.microsoft.com/office/drawing/2014/main" id="{8159EDBA-1675-7265-EAAC-80AEEA8C611D}"/>
               </a:ext>
             </a:extLst>
           </p:cNvPr>
@@ -7484,7 +9412,7 @@
         </p:nvSpPr>
         <p:spPr>
           <a:xfrm>
-            <a:off x="1066802" y="1977542"/>
+            <a:off x="1066802" y="1776374"/>
             <a:ext cx="9814558" cy="4203801"/>
           </a:xfrm>
         </p:spPr>
@@ -7495,16 +9423,94 @@
           <a:lstStyle/>
           <a:p>
             <a:r>
-              <a:rPr lang="en-US" sz="1600" dirty="0"/>
-              <a:t>Slide #</a:t>
-            </a:r>
-          </a:p>
-        </p:txBody>
-      </p:sp>
+              <a:rPr lang="en-US" sz="1400" dirty="0"/>
+              <a:t>Question 1: How do nutrition, physical activity, and obesity metrics vary across different states?</a:t>
+            </a:r>
+          </a:p>
+          <a:p>
+            <a:endParaRPr lang="en-US" sz="2200" dirty="0"/>
+          </a:p>
+          <a:p>
+            <a:endParaRPr lang="en-US" dirty="0"/>
+          </a:p>
+        </p:txBody>
+      </p:sp>
+      <p:pic>
+        <p:nvPicPr>
+          <p:cNvPr id="8" name="Picture 7" descr="A graph of obesity percentage&#10;&#10;Description automatically generated">
+            <a:extLst>
+              <a:ext uri="{FF2B5EF4-FFF2-40B4-BE49-F238E27FC236}">
+                <a16:creationId xmlns:a16="http://schemas.microsoft.com/office/drawing/2014/main" id="{1DBF05C5-3A44-69D3-9EE8-2AC68F9B826F}"/>
+              </a:ext>
+            </a:extLst>
+          </p:cNvPr>
+          <p:cNvPicPr>
+            <a:picLocks noChangeAspect="1"/>
+          </p:cNvPicPr>
+          <p:nvPr/>
+        </p:nvPicPr>
+        <p:blipFill>
+          <a:blip r:embed="rId3">
+            <a:extLst>
+              <a:ext uri="{28A0092B-C50C-407E-A947-70E740481C1C}">
+                <a14:useLocalDpi xmlns:a14="http://schemas.microsoft.com/office/drawing/2010/main" val="0"/>
+              </a:ext>
+            </a:extLst>
+          </a:blip>
+          <a:stretch>
+            <a:fillRect/>
+          </a:stretch>
+        </p:blipFill>
+        <p:spPr>
+          <a:xfrm>
+            <a:off x="1066778" y="2193404"/>
+            <a:ext cx="5036874" cy="3109722"/>
+          </a:xfrm>
+          <a:prstGeom prst="rect">
+            <a:avLst/>
+          </a:prstGeom>
+        </p:spPr>
+      </p:pic>
+      <p:pic>
+        <p:nvPicPr>
+          <p:cNvPr id="12" name="Picture 11" descr="A graph of a vegetable consumption&#10;&#10;Description automatically generated">
+            <a:extLst>
+              <a:ext uri="{FF2B5EF4-FFF2-40B4-BE49-F238E27FC236}">
+                <a16:creationId xmlns:a16="http://schemas.microsoft.com/office/drawing/2014/main" id="{2A64F0A1-FE46-DB44-08EF-7BBBD9853162}"/>
+              </a:ext>
+            </a:extLst>
+          </p:cNvPr>
+          <p:cNvPicPr>
+            <a:picLocks noChangeAspect="1"/>
+          </p:cNvPicPr>
+          <p:nvPr/>
+        </p:nvPicPr>
+        <p:blipFill>
+          <a:blip r:embed="rId4">
+            <a:extLst>
+              <a:ext uri="{28A0092B-C50C-407E-A947-70E740481C1C}">
+                <a14:useLocalDpi xmlns:a14="http://schemas.microsoft.com/office/drawing/2010/main" val="0"/>
+              </a:ext>
+            </a:extLst>
+          </a:blip>
+          <a:stretch>
+            <a:fillRect/>
+          </a:stretch>
+        </p:blipFill>
+        <p:spPr>
+          <a:xfrm>
+            <a:off x="6107365" y="2274550"/>
+            <a:ext cx="4911155" cy="3032104"/>
+          </a:xfrm>
+          <a:prstGeom prst="rect">
+            <a:avLst/>
+          </a:prstGeom>
+        </p:spPr>
+      </p:pic>
     </p:spTree>
     <p:extLst>
       <p:ext uri="{BB962C8B-B14F-4D97-AF65-F5344CB8AC3E}">
-        <p14:creationId xmlns:p14="http://schemas.microsoft.com/office/powerpoint/2010/main" val="1116715139"/>
+        <p14:creationId xmlns:p14="http://schemas.microsoft.com/office/powerpoint/2010/main" val="1915231339"/>
       </p:ext>
     </p:extLst>
   </p:cSld>

</xml_diff>